<commit_message>
ppt for 2nd presentation
</commit_message>
<xml_diff>
--- a/docs/Presentation.pptx
+++ b/docs/Presentation.pptx
@@ -9,14 +9,21 @@
     <p:sldId id="257" r:id="rId3"/>
     <p:sldId id="258" r:id="rId4"/>
     <p:sldId id="262" r:id="rId5"/>
-    <p:sldId id="263" r:id="rId6"/>
-    <p:sldId id="264" r:id="rId7"/>
-    <p:sldId id="267" r:id="rId8"/>
-    <p:sldId id="259" r:id="rId9"/>
-    <p:sldId id="265" r:id="rId10"/>
-    <p:sldId id="266" r:id="rId11"/>
-    <p:sldId id="260" r:id="rId12"/>
-    <p:sldId id="261" r:id="rId13"/>
+    <p:sldId id="264" r:id="rId6"/>
+    <p:sldId id="267" r:id="rId7"/>
+    <p:sldId id="259" r:id="rId8"/>
+    <p:sldId id="265" r:id="rId9"/>
+    <p:sldId id="266" r:id="rId10"/>
+    <p:sldId id="269" r:id="rId11"/>
+    <p:sldId id="270" r:id="rId12"/>
+    <p:sldId id="271" r:id="rId13"/>
+    <p:sldId id="272" r:id="rId14"/>
+    <p:sldId id="273" r:id="rId15"/>
+    <p:sldId id="274" r:id="rId16"/>
+    <p:sldId id="275" r:id="rId17"/>
+    <p:sldId id="276" r:id="rId18"/>
+    <p:sldId id="260" r:id="rId19"/>
+    <p:sldId id="261" r:id="rId20"/>
   </p:sldIdLst>
   <p:sldSz cx="12192000" cy="6858000"/>
   <p:notesSz cx="6858000" cy="9144000"/>
@@ -128,10 +135,13 @@
   <p1510:revLst>
     <p1510:client id="{1160FAA9-F999-4E44-9E74-425A0C1DC568}" v="1223" dt="2020-02-17T14:44:16.976"/>
     <p1510:client id="{1AA8C00A-21E9-487B-9FFB-3B0D252F9148}" v="1706" dt="2020-02-24T16:31:04.614"/>
+    <p1510:client id="{20423B53-5D3F-42C1-A728-93E76E8B30A8}" v="3033" dt="2020-03-30T10:53:26.520"/>
+    <p1510:client id="{2D5470B4-B7C2-416A-BF9E-2F5E3EB17E3F}" v="426" dt="2020-02-26T10:25:20.069"/>
     <p1510:client id="{64FF0B97-F6D2-4476-A64B-538B9E443636}" v="3778" dt="2020-01-24T16:44:16.639"/>
     <p1510:client id="{88AEB5F3-CAE5-4B99-AE53-89C14A09FB99}" v="1030" dt="2020-02-01T09:01:49.276"/>
     <p1510:client id="{970F2756-6D48-4F87-AD03-74F0E83451BF}" v="40" dt="2020-02-01T05:49:26.211"/>
-    <p1510:client id="{CD649366-30A7-412D-8605-5CBD1A566ADE}" v="79" dt="2020-02-26T08:54:56.007"/>
+    <p1510:client id="{9E95AE69-D439-4F7B-9DC9-FDF50A79AC93}" v="36" dt="2020-03-29T08:24:21.112"/>
+    <p1510:client id="{CD649366-30A7-412D-8605-5CBD1A566ADE}" v="1079" dt="2020-02-26T10:22:40.245"/>
     <p1510:client id="{D0024680-6A6C-4C2C-9317-51B80E01B98A}" v="2863" dt="2020-02-14T15:52:35.637"/>
   </p1510:revLst>
 </p1510:revInfo>
@@ -268,7 +278,7 @@
           <a:p>
             <a:fld id="{846CE7D5-CF57-46EF-B807-FDD0502418D4}" type="datetimeFigureOut">
               <a:rPr lang="en-US" smtClean="0"/>
-              <a:t>2/26/2020</a:t>
+              <a:t>3/30/2020</a:t>
             </a:fld>
             <a:endParaRPr lang="en-US"/>
           </a:p>
@@ -438,7 +448,7 @@
           <a:p>
             <a:fld id="{846CE7D5-CF57-46EF-B807-FDD0502418D4}" type="datetimeFigureOut">
               <a:rPr lang="en-US" smtClean="0"/>
-              <a:t>2/26/2020</a:t>
+              <a:t>3/30/2020</a:t>
             </a:fld>
             <a:endParaRPr lang="en-US"/>
           </a:p>
@@ -618,7 +628,7 @@
           <a:p>
             <a:fld id="{846CE7D5-CF57-46EF-B807-FDD0502418D4}" type="datetimeFigureOut">
               <a:rPr lang="en-US" smtClean="0"/>
-              <a:t>2/26/2020</a:t>
+              <a:t>3/30/2020</a:t>
             </a:fld>
             <a:endParaRPr lang="en-US"/>
           </a:p>
@@ -788,7 +798,7 @@
           <a:p>
             <a:fld id="{846CE7D5-CF57-46EF-B807-FDD0502418D4}" type="datetimeFigureOut">
               <a:rPr lang="en-US" smtClean="0"/>
-              <a:t>2/26/2020</a:t>
+              <a:t>3/30/2020</a:t>
             </a:fld>
             <a:endParaRPr lang="en-US"/>
           </a:p>
@@ -1034,7 +1044,7 @@
           <a:p>
             <a:fld id="{846CE7D5-CF57-46EF-B807-FDD0502418D4}" type="datetimeFigureOut">
               <a:rPr lang="en-US" smtClean="0"/>
-              <a:t>2/26/2020</a:t>
+              <a:t>3/30/2020</a:t>
             </a:fld>
             <a:endParaRPr lang="en-US"/>
           </a:p>
@@ -1266,7 +1276,7 @@
           <a:p>
             <a:fld id="{846CE7D5-CF57-46EF-B807-FDD0502418D4}" type="datetimeFigureOut">
               <a:rPr lang="en-US" smtClean="0"/>
-              <a:t>2/26/2020</a:t>
+              <a:t>3/30/2020</a:t>
             </a:fld>
             <a:endParaRPr lang="en-US"/>
           </a:p>
@@ -1633,7 +1643,7 @@
           <a:p>
             <a:fld id="{846CE7D5-CF57-46EF-B807-FDD0502418D4}" type="datetimeFigureOut">
               <a:rPr lang="en-US" smtClean="0"/>
-              <a:t>2/26/2020</a:t>
+              <a:t>3/30/2020</a:t>
             </a:fld>
             <a:endParaRPr lang="en-US"/>
           </a:p>
@@ -1751,7 +1761,7 @@
           <a:p>
             <a:fld id="{846CE7D5-CF57-46EF-B807-FDD0502418D4}" type="datetimeFigureOut">
               <a:rPr lang="en-US" smtClean="0"/>
-              <a:t>2/26/2020</a:t>
+              <a:t>3/30/2020</a:t>
             </a:fld>
             <a:endParaRPr lang="en-US"/>
           </a:p>
@@ -1846,7 +1856,7 @@
           <a:p>
             <a:fld id="{846CE7D5-CF57-46EF-B807-FDD0502418D4}" type="datetimeFigureOut">
               <a:rPr lang="en-US" smtClean="0"/>
-              <a:t>2/26/2020</a:t>
+              <a:t>3/30/2020</a:t>
             </a:fld>
             <a:endParaRPr lang="en-US"/>
           </a:p>
@@ -2123,7 +2133,7 @@
           <a:p>
             <a:fld id="{846CE7D5-CF57-46EF-B807-FDD0502418D4}" type="datetimeFigureOut">
               <a:rPr lang="en-US" smtClean="0"/>
-              <a:t>2/26/2020</a:t>
+              <a:t>3/30/2020</a:t>
             </a:fld>
             <a:endParaRPr lang="en-US"/>
           </a:p>
@@ -2380,7 +2390,7 @@
           <a:p>
             <a:fld id="{846CE7D5-CF57-46EF-B807-FDD0502418D4}" type="datetimeFigureOut">
               <a:rPr lang="en-US" smtClean="0"/>
-              <a:t>2/26/2020</a:t>
+              <a:t>3/30/2020</a:t>
             </a:fld>
             <a:endParaRPr lang="en-US"/>
           </a:p>
@@ -2593,7 +2603,7 @@
           <a:p>
             <a:fld id="{846CE7D5-CF57-46EF-B807-FDD0502418D4}" type="datetimeFigureOut">
               <a:rPr lang="en-US" smtClean="0"/>
-              <a:t>2/26/2020</a:t>
+              <a:t>3/30/2020</a:t>
             </a:fld>
             <a:endParaRPr lang="en-US"/>
           </a:p>
@@ -3237,89 +3247,164 @@
           <a:chExt cx="0" cy="0"/>
         </a:xfrm>
       </p:grpSpPr>
-      <p:sp>
-        <p:nvSpPr>
-          <p:cNvPr id="2" name="Title 1">
+      <p:pic>
+        <p:nvPicPr>
+          <p:cNvPr id="2" name="Picture 2" descr="A screenshot of a cell phone&#10;&#10;Description generated with very high confidence">
             <a:extLst>
               <a:ext uri="{FF2B5EF4-FFF2-40B4-BE49-F238E27FC236}">
-                <a16:creationId xmlns:a16="http://schemas.microsoft.com/office/drawing/2014/main" id="{EF06EA2A-5335-41A7-B88A-5440702D3A5C}"/>
+                <a16:creationId xmlns:a16="http://schemas.microsoft.com/office/drawing/2014/main" id="{254E2AA7-AD54-4183-B5E7-AA9CBC44E2AD}"/>
               </a:ext>
             </a:extLst>
           </p:cNvPr>
-          <p:cNvSpPr>
-            <a:spLocks noGrp="1"/>
-          </p:cNvSpPr>
-          <p:nvPr>
-            <p:ph type="title"/>
-          </p:nvPr>
-        </p:nvSpPr>
-        <p:spPr/>
-        <p:txBody>
-          <a:bodyPr/>
-          <a:lstStyle/>
-          <a:p>
-            <a:pPr algn="ctr"/>
-            <a:r>
-              <a:rPr lang="en-US">
-                <a:cs typeface="Calibri Light" panose="020F0302020204030204"/>
-              </a:rPr>
-              <a:t>Non-functional Requirements</a:t>
-            </a:r>
-          </a:p>
-        </p:txBody>
-      </p:sp>
-      <p:sp>
-        <p:nvSpPr>
-          <p:cNvPr id="3" name="Content Placeholder 2">
+          <p:cNvPicPr>
+            <a:picLocks noChangeAspect="1"/>
+          </p:cNvPicPr>
+          <p:nvPr/>
+        </p:nvPicPr>
+        <p:blipFill>
+          <a:blip r:embed="rId2"/>
+          <a:stretch>
+            <a:fillRect/>
+          </a:stretch>
+        </p:blipFill>
+        <p:spPr>
+          <a:xfrm>
+            <a:off x="5050155" y="-3717"/>
+            <a:ext cx="3383372" cy="6865433"/>
+          </a:xfrm>
+          <a:prstGeom prst="rect">
+            <a:avLst/>
+          </a:prstGeom>
+        </p:spPr>
+      </p:pic>
+      <p:sp>
+        <p:nvSpPr>
+          <p:cNvPr id="4" name="TextBox 1">
             <a:extLst>
               <a:ext uri="{FF2B5EF4-FFF2-40B4-BE49-F238E27FC236}">
-                <a16:creationId xmlns:a16="http://schemas.microsoft.com/office/drawing/2014/main" id="{829A0375-0F36-4FC5-94C5-2BD1EF3C4534}"/>
+                <a16:creationId xmlns:a16="http://schemas.microsoft.com/office/drawing/2014/main" id="{A8BA48F2-ECF0-46FC-8D6D-83BE11E91723}"/>
               </a:ext>
             </a:extLst>
           </p:cNvPr>
-          <p:cNvSpPr>
-            <a:spLocks noGrp="1"/>
-          </p:cNvSpPr>
-          <p:nvPr>
-            <p:ph idx="1"/>
-          </p:nvPr>
-        </p:nvSpPr>
-        <p:spPr/>
-        <p:txBody>
-          <a:bodyPr vert="horz" lIns="91440" tIns="45720" rIns="91440" bIns="45720" rtlCol="0" anchor="t">
-            <a:normAutofit/>
+          <p:cNvSpPr txBox="1"/>
+          <p:nvPr/>
+        </p:nvSpPr>
+        <p:spPr>
+          <a:xfrm>
+            <a:off x="1330842" y="985284"/>
+            <a:ext cx="2743200" cy="369332"/>
+          </a:xfrm>
+          <a:prstGeom prst="rect">
+            <a:avLst/>
+          </a:prstGeom>
+          <a:noFill/>
+        </p:spPr>
+        <p:txBody>
+          <a:bodyPr rot="0" spcFirstLastPara="0" vert="horz" wrap="square" lIns="91440" tIns="45720" rIns="91440" bIns="45720" numCol="1" spcCol="0" rtlCol="0" fromWordArt="0" anchor="t" anchorCtr="0" forceAA="0" compatLnSpc="1">
+            <a:prstTxWarp prst="textNoShape">
+              <a:avLst/>
+            </a:prstTxWarp>
+            <a:spAutoFit/>
           </a:bodyPr>
-          <a:lstStyle/>
-          <a:p>
-            <a:r>
-              <a:rPr lang="en-US" dirty="0">
-                <a:cs typeface="Calibri"/>
-              </a:rPr>
-              <a:t>Scaling: To be able to build more NLP APIs for different tasks.</a:t>
-            </a:r>
-          </a:p>
-          <a:p>
-            <a:r>
-              <a:rPr lang="en-US" dirty="0">
-                <a:cs typeface="Calibri"/>
-              </a:rPr>
-              <a:t>Performance: Increase accuracy of the predictions.</a:t>
-            </a:r>
-          </a:p>
-          <a:p>
-            <a:r>
-              <a:rPr lang="en-US" dirty="0">
-                <a:cs typeface="Calibri"/>
-              </a:rPr>
-              <a:t>Availability: To make sure that the web-app is always functioning properly and available to its users.</a:t>
-            </a:r>
-          </a:p>
-          <a:p>
-            <a:r>
-              <a:rPr lang="en-US" dirty="0">
-                <a:cs typeface="Calibri"/>
-              </a:rPr>
-              <a:t>Maintenance: Future updates must be smooth. Should work well with future versions of the technologies used.</a:t>
+          <a:lstStyle>
+            <a:defPPr>
+              <a:defRPr lang="en-US"/>
+            </a:defPPr>
+            <a:lvl1pPr marL="0" algn="l" defTabSz="914400" rtl="0" eaLnBrk="1" latinLnBrk="0" hangingPunct="1">
+              <a:defRPr sz="1800" kern="1200">
+                <a:solidFill>
+                  <a:schemeClr val="tx1"/>
+                </a:solidFill>
+                <a:latin typeface="+mn-lt"/>
+                <a:ea typeface="+mn-ea"/>
+                <a:cs typeface="+mn-cs"/>
+              </a:defRPr>
+            </a:lvl1pPr>
+            <a:lvl2pPr marL="457200" algn="l" defTabSz="914400" rtl="0" eaLnBrk="1" latinLnBrk="0" hangingPunct="1">
+              <a:defRPr sz="1800" kern="1200">
+                <a:solidFill>
+                  <a:schemeClr val="tx1"/>
+                </a:solidFill>
+                <a:latin typeface="+mn-lt"/>
+                <a:ea typeface="+mn-ea"/>
+                <a:cs typeface="+mn-cs"/>
+              </a:defRPr>
+            </a:lvl2pPr>
+            <a:lvl3pPr marL="914400" algn="l" defTabSz="914400" rtl="0" eaLnBrk="1" latinLnBrk="0" hangingPunct="1">
+              <a:defRPr sz="1800" kern="1200">
+                <a:solidFill>
+                  <a:schemeClr val="tx1"/>
+                </a:solidFill>
+                <a:latin typeface="+mn-lt"/>
+                <a:ea typeface="+mn-ea"/>
+                <a:cs typeface="+mn-cs"/>
+              </a:defRPr>
+            </a:lvl3pPr>
+            <a:lvl4pPr marL="1371600" algn="l" defTabSz="914400" rtl="0" eaLnBrk="1" latinLnBrk="0" hangingPunct="1">
+              <a:defRPr sz="1800" kern="1200">
+                <a:solidFill>
+                  <a:schemeClr val="tx1"/>
+                </a:solidFill>
+                <a:latin typeface="+mn-lt"/>
+                <a:ea typeface="+mn-ea"/>
+                <a:cs typeface="+mn-cs"/>
+              </a:defRPr>
+            </a:lvl4pPr>
+            <a:lvl5pPr marL="1828800" algn="l" defTabSz="914400" rtl="0" eaLnBrk="1" latinLnBrk="0" hangingPunct="1">
+              <a:defRPr sz="1800" kern="1200">
+                <a:solidFill>
+                  <a:schemeClr val="tx1"/>
+                </a:solidFill>
+                <a:latin typeface="+mn-lt"/>
+                <a:ea typeface="+mn-ea"/>
+                <a:cs typeface="+mn-cs"/>
+              </a:defRPr>
+            </a:lvl5pPr>
+            <a:lvl6pPr marL="2286000" algn="l" defTabSz="914400" rtl="0" eaLnBrk="1" latinLnBrk="0" hangingPunct="1">
+              <a:defRPr sz="1800" kern="1200">
+                <a:solidFill>
+                  <a:schemeClr val="tx1"/>
+                </a:solidFill>
+                <a:latin typeface="+mn-lt"/>
+                <a:ea typeface="+mn-ea"/>
+                <a:cs typeface="+mn-cs"/>
+              </a:defRPr>
+            </a:lvl6pPr>
+            <a:lvl7pPr marL="2743200" algn="l" defTabSz="914400" rtl="0" eaLnBrk="1" latinLnBrk="0" hangingPunct="1">
+              <a:defRPr sz="1800" kern="1200">
+                <a:solidFill>
+                  <a:schemeClr val="tx1"/>
+                </a:solidFill>
+                <a:latin typeface="+mn-lt"/>
+                <a:ea typeface="+mn-ea"/>
+                <a:cs typeface="+mn-cs"/>
+              </a:defRPr>
+            </a:lvl7pPr>
+            <a:lvl8pPr marL="3200400" algn="l" defTabSz="914400" rtl="0" eaLnBrk="1" latinLnBrk="0" hangingPunct="1">
+              <a:defRPr sz="1800" kern="1200">
+                <a:solidFill>
+                  <a:schemeClr val="tx1"/>
+                </a:solidFill>
+                <a:latin typeface="+mn-lt"/>
+                <a:ea typeface="+mn-ea"/>
+                <a:cs typeface="+mn-cs"/>
+              </a:defRPr>
+            </a:lvl8pPr>
+            <a:lvl9pPr marL="3657600" algn="l" defTabSz="914400" rtl="0" eaLnBrk="1" latinLnBrk="0" hangingPunct="1">
+              <a:defRPr sz="1800" kern="1200">
+                <a:solidFill>
+                  <a:schemeClr val="tx1"/>
+                </a:solidFill>
+                <a:latin typeface="+mn-lt"/>
+                <a:ea typeface="+mn-ea"/>
+                <a:cs typeface="+mn-cs"/>
+              </a:defRPr>
+            </a:lvl9pPr>
+          </a:lstStyle>
+          <a:p>
+            <a:r>
+              <a:rPr lang="en-US" dirty="0"/>
+              <a:t>Flow Diagram – ML View</a:t>
             </a:r>
           </a:p>
         </p:txBody>
@@ -3327,7 +3412,7 @@
     </p:spTree>
     <p:extLst>
       <p:ext uri="{BB962C8B-B14F-4D97-AF65-F5344CB8AC3E}">
-        <p14:creationId xmlns:p14="http://schemas.microsoft.com/office/powerpoint/2010/main" val="4109507159"/>
+        <p14:creationId xmlns:p14="http://schemas.microsoft.com/office/powerpoint/2010/main" val="608533324"/>
       </p:ext>
     </p:extLst>
   </p:cSld>
@@ -3356,6 +3441,1259 @@
       </p:grpSpPr>
       <p:sp>
         <p:nvSpPr>
+          <p:cNvPr id="2" name="TextBox 1">
+            <a:extLst>
+              <a:ext uri="{FF2B5EF4-FFF2-40B4-BE49-F238E27FC236}">
+                <a16:creationId xmlns:a16="http://schemas.microsoft.com/office/drawing/2014/main" id="{A8BA48F2-ECF0-46FC-8D6D-83BE11E91723}"/>
+              </a:ext>
+            </a:extLst>
+          </p:cNvPr>
+          <p:cNvSpPr txBox="1"/>
+          <p:nvPr/>
+        </p:nvSpPr>
+        <p:spPr>
+          <a:xfrm>
+            <a:off x="1330842" y="985284"/>
+            <a:ext cx="3062176" cy="369332"/>
+          </a:xfrm>
+          <a:prstGeom prst="rect">
+            <a:avLst/>
+          </a:prstGeom>
+          <a:noFill/>
+        </p:spPr>
+        <p:txBody>
+          <a:bodyPr rot="0" spcFirstLastPara="0" vert="horz" wrap="square" lIns="91440" tIns="45720" rIns="91440" bIns="45720" numCol="1" spcCol="0" rtlCol="0" fromWordArt="0" anchor="t" anchorCtr="0" forceAA="0" compatLnSpc="1">
+            <a:prstTxWarp prst="textNoShape">
+              <a:avLst/>
+            </a:prstTxWarp>
+            <a:spAutoFit/>
+          </a:bodyPr>
+          <a:lstStyle>
+            <a:defPPr>
+              <a:defRPr lang="en-US"/>
+            </a:defPPr>
+            <a:lvl1pPr marL="0" algn="l" defTabSz="914400" rtl="0" eaLnBrk="1" latinLnBrk="0" hangingPunct="1">
+              <a:defRPr sz="1800" kern="1200">
+                <a:solidFill>
+                  <a:schemeClr val="tx1"/>
+                </a:solidFill>
+                <a:latin typeface="+mn-lt"/>
+                <a:ea typeface="+mn-ea"/>
+                <a:cs typeface="+mn-cs"/>
+              </a:defRPr>
+            </a:lvl1pPr>
+            <a:lvl2pPr marL="457200" algn="l" defTabSz="914400" rtl="0" eaLnBrk="1" latinLnBrk="0" hangingPunct="1">
+              <a:defRPr sz="1800" kern="1200">
+                <a:solidFill>
+                  <a:schemeClr val="tx1"/>
+                </a:solidFill>
+                <a:latin typeface="+mn-lt"/>
+                <a:ea typeface="+mn-ea"/>
+                <a:cs typeface="+mn-cs"/>
+              </a:defRPr>
+            </a:lvl2pPr>
+            <a:lvl3pPr marL="914400" algn="l" defTabSz="914400" rtl="0" eaLnBrk="1" latinLnBrk="0" hangingPunct="1">
+              <a:defRPr sz="1800" kern="1200">
+                <a:solidFill>
+                  <a:schemeClr val="tx1"/>
+                </a:solidFill>
+                <a:latin typeface="+mn-lt"/>
+                <a:ea typeface="+mn-ea"/>
+                <a:cs typeface="+mn-cs"/>
+              </a:defRPr>
+            </a:lvl3pPr>
+            <a:lvl4pPr marL="1371600" algn="l" defTabSz="914400" rtl="0" eaLnBrk="1" latinLnBrk="0" hangingPunct="1">
+              <a:defRPr sz="1800" kern="1200">
+                <a:solidFill>
+                  <a:schemeClr val="tx1"/>
+                </a:solidFill>
+                <a:latin typeface="+mn-lt"/>
+                <a:ea typeface="+mn-ea"/>
+                <a:cs typeface="+mn-cs"/>
+              </a:defRPr>
+            </a:lvl4pPr>
+            <a:lvl5pPr marL="1828800" algn="l" defTabSz="914400" rtl="0" eaLnBrk="1" latinLnBrk="0" hangingPunct="1">
+              <a:defRPr sz="1800" kern="1200">
+                <a:solidFill>
+                  <a:schemeClr val="tx1"/>
+                </a:solidFill>
+                <a:latin typeface="+mn-lt"/>
+                <a:ea typeface="+mn-ea"/>
+                <a:cs typeface="+mn-cs"/>
+              </a:defRPr>
+            </a:lvl5pPr>
+            <a:lvl6pPr marL="2286000" algn="l" defTabSz="914400" rtl="0" eaLnBrk="1" latinLnBrk="0" hangingPunct="1">
+              <a:defRPr sz="1800" kern="1200">
+                <a:solidFill>
+                  <a:schemeClr val="tx1"/>
+                </a:solidFill>
+                <a:latin typeface="+mn-lt"/>
+                <a:ea typeface="+mn-ea"/>
+                <a:cs typeface="+mn-cs"/>
+              </a:defRPr>
+            </a:lvl6pPr>
+            <a:lvl7pPr marL="2743200" algn="l" defTabSz="914400" rtl="0" eaLnBrk="1" latinLnBrk="0" hangingPunct="1">
+              <a:defRPr sz="1800" kern="1200">
+                <a:solidFill>
+                  <a:schemeClr val="tx1"/>
+                </a:solidFill>
+                <a:latin typeface="+mn-lt"/>
+                <a:ea typeface="+mn-ea"/>
+                <a:cs typeface="+mn-cs"/>
+              </a:defRPr>
+            </a:lvl7pPr>
+            <a:lvl8pPr marL="3200400" algn="l" defTabSz="914400" rtl="0" eaLnBrk="1" latinLnBrk="0" hangingPunct="1">
+              <a:defRPr sz="1800" kern="1200">
+                <a:solidFill>
+                  <a:schemeClr val="tx1"/>
+                </a:solidFill>
+                <a:latin typeface="+mn-lt"/>
+                <a:ea typeface="+mn-ea"/>
+                <a:cs typeface="+mn-cs"/>
+              </a:defRPr>
+            </a:lvl8pPr>
+            <a:lvl9pPr marL="3657600" algn="l" defTabSz="914400" rtl="0" eaLnBrk="1" latinLnBrk="0" hangingPunct="1">
+              <a:defRPr sz="1800" kern="1200">
+                <a:solidFill>
+                  <a:schemeClr val="tx1"/>
+                </a:solidFill>
+                <a:latin typeface="+mn-lt"/>
+                <a:ea typeface="+mn-ea"/>
+                <a:cs typeface="+mn-cs"/>
+              </a:defRPr>
+            </a:lvl9pPr>
+          </a:lstStyle>
+          <a:p>
+            <a:r>
+              <a:rPr lang="en-US" dirty="0"/>
+              <a:t>Flow Diagram – Web App View</a:t>
+            </a:r>
+          </a:p>
+        </p:txBody>
+      </p:sp>
+      <p:pic>
+        <p:nvPicPr>
+          <p:cNvPr id="3" name="Picture 3" descr="A screenshot of a cell phone&#10;&#10;Description generated with very high confidence">
+            <a:extLst>
+              <a:ext uri="{FF2B5EF4-FFF2-40B4-BE49-F238E27FC236}">
+                <a16:creationId xmlns:a16="http://schemas.microsoft.com/office/drawing/2014/main" id="{C0471691-9AE0-41BB-8F24-BF13A248E70D}"/>
+              </a:ext>
+            </a:extLst>
+          </p:cNvPr>
+          <p:cNvPicPr>
+            <a:picLocks noChangeAspect="1"/>
+          </p:cNvPicPr>
+          <p:nvPr/>
+        </p:nvPicPr>
+        <p:blipFill>
+          <a:blip r:embed="rId2"/>
+          <a:stretch>
+            <a:fillRect/>
+          </a:stretch>
+        </p:blipFill>
+        <p:spPr>
+          <a:xfrm>
+            <a:off x="4724400" y="983325"/>
+            <a:ext cx="6125736" cy="5123666"/>
+          </a:xfrm>
+          <a:prstGeom prst="rect">
+            <a:avLst/>
+          </a:prstGeom>
+        </p:spPr>
+      </p:pic>
+    </p:spTree>
+    <p:extLst>
+      <p:ext uri="{BB962C8B-B14F-4D97-AF65-F5344CB8AC3E}">
+        <p14:creationId xmlns:p14="http://schemas.microsoft.com/office/powerpoint/2010/main" val="309574019"/>
+      </p:ext>
+    </p:extLst>
+  </p:cSld>
+  <p:clrMapOvr>
+    <a:masterClrMapping/>
+  </p:clrMapOvr>
+</p:sld>
+</file>
+
+<file path=ppt/slides/slide12.xml><?xml version="1.0" encoding="utf-8"?>
+<p:sld xmlns:a="http://schemas.openxmlformats.org/drawingml/2006/main" xmlns:r="http://schemas.openxmlformats.org/officeDocument/2006/relationships" xmlns:p="http://schemas.openxmlformats.org/presentationml/2006/main">
+  <p:cSld>
+    <p:spTree>
+      <p:nvGrpSpPr>
+        <p:cNvPr id="1" name=""/>
+        <p:cNvGrpSpPr/>
+        <p:nvPr/>
+      </p:nvGrpSpPr>
+      <p:grpSpPr>
+        <a:xfrm>
+          <a:off x="0" y="0"/>
+          <a:ext cx="0" cy="0"/>
+          <a:chOff x="0" y="0"/>
+          <a:chExt cx="0" cy="0"/>
+        </a:xfrm>
+      </p:grpSpPr>
+      <p:sp>
+        <p:nvSpPr>
+          <p:cNvPr id="2" name="Title 1">
+            <a:extLst>
+              <a:ext uri="{FF2B5EF4-FFF2-40B4-BE49-F238E27FC236}">
+                <a16:creationId xmlns:a16="http://schemas.microsoft.com/office/drawing/2014/main" id="{21797F86-3438-47FD-B5D2-6D9FE8A47798}"/>
+              </a:ext>
+            </a:extLst>
+          </p:cNvPr>
+          <p:cNvSpPr>
+            <a:spLocks noGrp="1"/>
+          </p:cNvSpPr>
+          <p:nvPr>
+            <p:ph type="title"/>
+          </p:nvPr>
+        </p:nvSpPr>
+        <p:spPr/>
+        <p:txBody>
+          <a:bodyPr/>
+          <a:lstStyle/>
+          <a:p>
+            <a:pPr algn="ctr"/>
+            <a:r>
+              <a:rPr lang="en-US" dirty="0">
+                <a:cs typeface="Calibri Light" panose="020F0302020204030204"/>
+              </a:rPr>
+              <a:t>Detailed Methodology</a:t>
+            </a:r>
+          </a:p>
+        </p:txBody>
+      </p:sp>
+      <p:sp>
+        <p:nvSpPr>
+          <p:cNvPr id="3" name="Content Placeholder 2">
+            <a:extLst>
+              <a:ext uri="{FF2B5EF4-FFF2-40B4-BE49-F238E27FC236}">
+                <a16:creationId xmlns:a16="http://schemas.microsoft.com/office/drawing/2014/main" id="{A6B7715D-E06D-4D95-B469-78B00FEE1280}"/>
+              </a:ext>
+            </a:extLst>
+          </p:cNvPr>
+          <p:cNvSpPr>
+            <a:spLocks noGrp="1"/>
+          </p:cNvSpPr>
+          <p:nvPr>
+            <p:ph idx="1"/>
+          </p:nvPr>
+        </p:nvSpPr>
+        <p:spPr/>
+        <p:txBody>
+          <a:bodyPr vert="horz" lIns="91440" tIns="45720" rIns="91440" bIns="45720" rtlCol="0" anchor="t">
+            <a:normAutofit fontScale="92500"/>
+          </a:bodyPr>
+          <a:lstStyle/>
+          <a:p>
+            <a:r>
+              <a:rPr lang="en-US" dirty="0">
+                <a:cs typeface="Calibri"/>
+              </a:rPr>
+              <a:t>How the text is pre-processed</a:t>
+            </a:r>
+          </a:p>
+          <a:p>
+            <a:pPr lvl="1"/>
+            <a:r>
+              <a:rPr lang="en-US" dirty="0">
+                <a:cs typeface="Calibri"/>
+              </a:rPr>
+              <a:t>The datasets contain text data that need some pre-processing. The neural network does not take in raw text data as input, so we need to convert this text data into a sequence of numbers (or a tensor) which is the appropriate input for the neural network.</a:t>
+            </a:r>
+          </a:p>
+          <a:p>
+            <a:pPr lvl="1"/>
+            <a:r>
+              <a:rPr lang="en-US" dirty="0">
+                <a:cs typeface="Calibri"/>
+              </a:rPr>
+              <a:t>A dictionary of words in the datasets are built first. If the dictionary is not built, new text inputs will be stored as [0, 0, 1, 2, 3, 4, etc.]. This leads to wrongful predictions.</a:t>
+            </a:r>
+          </a:p>
+          <a:p>
+            <a:pPr lvl="1"/>
+            <a:r>
+              <a:rPr lang="en-US" dirty="0">
+                <a:cs typeface="Calibri"/>
+              </a:rPr>
+              <a:t>The text data is then passed to another function which does lemmatization. Lemmatization is removing connectors in sentences like and, it, there and simplifies words like "do, done, doing, did" into "do".</a:t>
+            </a:r>
+          </a:p>
+          <a:p>
+            <a:pPr lvl="1"/>
+            <a:r>
+              <a:rPr lang="en-US" dirty="0">
+                <a:cs typeface="Calibri"/>
+              </a:rPr>
+              <a:t>This list of words is then passed to another function that tokenizes it. Tokenizing is converting the list of words into sequences of numbers so that they can be used as input to the neural network.</a:t>
+            </a:r>
+            <a:endParaRPr lang="en-US" dirty="0"/>
+          </a:p>
+        </p:txBody>
+      </p:sp>
+    </p:spTree>
+    <p:extLst>
+      <p:ext uri="{BB962C8B-B14F-4D97-AF65-F5344CB8AC3E}">
+        <p14:creationId xmlns:p14="http://schemas.microsoft.com/office/powerpoint/2010/main" val="956708869"/>
+      </p:ext>
+    </p:extLst>
+  </p:cSld>
+  <p:clrMapOvr>
+    <a:masterClrMapping/>
+  </p:clrMapOvr>
+</p:sld>
+</file>
+
+<file path=ppt/slides/slide13.xml><?xml version="1.0" encoding="utf-8"?>
+<p:sld xmlns:a="http://schemas.openxmlformats.org/drawingml/2006/main" xmlns:r="http://schemas.openxmlformats.org/officeDocument/2006/relationships" xmlns:p="http://schemas.openxmlformats.org/presentationml/2006/main">
+  <p:cSld>
+    <p:spTree>
+      <p:nvGrpSpPr>
+        <p:cNvPr id="1" name=""/>
+        <p:cNvGrpSpPr/>
+        <p:nvPr/>
+      </p:nvGrpSpPr>
+      <p:grpSpPr>
+        <a:xfrm>
+          <a:off x="0" y="0"/>
+          <a:ext cx="0" cy="0"/>
+          <a:chOff x="0" y="0"/>
+          <a:chExt cx="0" cy="0"/>
+        </a:xfrm>
+      </p:grpSpPr>
+      <p:sp>
+        <p:nvSpPr>
+          <p:cNvPr id="2" name="Title 1">
+            <a:extLst>
+              <a:ext uri="{FF2B5EF4-FFF2-40B4-BE49-F238E27FC236}">
+                <a16:creationId xmlns:a16="http://schemas.microsoft.com/office/drawing/2014/main" id="{62700633-8410-42C7-8E8C-D0A31453D838}"/>
+              </a:ext>
+            </a:extLst>
+          </p:cNvPr>
+          <p:cNvSpPr>
+            <a:spLocks noGrp="1"/>
+          </p:cNvSpPr>
+          <p:nvPr>
+            <p:ph type="title"/>
+          </p:nvPr>
+        </p:nvSpPr>
+        <p:spPr/>
+        <p:txBody>
+          <a:bodyPr/>
+          <a:lstStyle/>
+          <a:p>
+            <a:pPr algn="ctr"/>
+            <a:r>
+              <a:rPr lang="en-US" dirty="0">
+                <a:cs typeface="Calibri Light" panose="020F0302020204030204"/>
+              </a:rPr>
+              <a:t>Detailed Methodology</a:t>
+            </a:r>
+          </a:p>
+        </p:txBody>
+      </p:sp>
+      <p:sp>
+        <p:nvSpPr>
+          <p:cNvPr id="3" name="Content Placeholder 2">
+            <a:extLst>
+              <a:ext uri="{FF2B5EF4-FFF2-40B4-BE49-F238E27FC236}">
+                <a16:creationId xmlns:a16="http://schemas.microsoft.com/office/drawing/2014/main" id="{D26B32AC-8E2D-4BEA-A55D-D382D388926E}"/>
+              </a:ext>
+            </a:extLst>
+          </p:cNvPr>
+          <p:cNvSpPr>
+            <a:spLocks noGrp="1"/>
+          </p:cNvSpPr>
+          <p:nvPr>
+            <p:ph idx="1"/>
+          </p:nvPr>
+        </p:nvSpPr>
+        <p:spPr/>
+        <p:txBody>
+          <a:bodyPr vert="horz" lIns="91440" tIns="45720" rIns="91440" bIns="45720" rtlCol="0" anchor="t">
+            <a:normAutofit/>
+          </a:bodyPr>
+          <a:lstStyle/>
+          <a:p>
+            <a:r>
+              <a:rPr lang="en-US" dirty="0">
+                <a:cs typeface="Calibri"/>
+              </a:rPr>
+              <a:t>How the text is pre-processed</a:t>
+            </a:r>
+          </a:p>
+          <a:p>
+            <a:pPr lvl="1"/>
+            <a:endParaRPr lang="en-US" dirty="0">
+              <a:cs typeface="Calibri"/>
+            </a:endParaRPr>
+          </a:p>
+        </p:txBody>
+      </p:sp>
+      <p:pic>
+        <p:nvPicPr>
+          <p:cNvPr id="4" name="Picture 4" descr="A screenshot of a cell phone&#10;&#10;Description generated with very high confidence">
+            <a:extLst>
+              <a:ext uri="{FF2B5EF4-FFF2-40B4-BE49-F238E27FC236}">
+                <a16:creationId xmlns:a16="http://schemas.microsoft.com/office/drawing/2014/main" id="{6A55683E-5C9F-4C72-8B61-97DBEB66F59B}"/>
+              </a:ext>
+            </a:extLst>
+          </p:cNvPr>
+          <p:cNvPicPr>
+            <a:picLocks noChangeAspect="1"/>
+          </p:cNvPicPr>
+          <p:nvPr/>
+        </p:nvPicPr>
+        <p:blipFill>
+          <a:blip r:embed="rId2"/>
+          <a:stretch>
+            <a:fillRect/>
+          </a:stretch>
+        </p:blipFill>
+        <p:spPr>
+          <a:xfrm>
+            <a:off x="1156010" y="2319175"/>
+            <a:ext cx="8328102" cy="4124650"/>
+          </a:xfrm>
+          <a:prstGeom prst="rect">
+            <a:avLst/>
+          </a:prstGeom>
+        </p:spPr>
+      </p:pic>
+    </p:spTree>
+    <p:extLst>
+      <p:ext uri="{BB962C8B-B14F-4D97-AF65-F5344CB8AC3E}">
+        <p14:creationId xmlns:p14="http://schemas.microsoft.com/office/powerpoint/2010/main" val="2452716225"/>
+      </p:ext>
+    </p:extLst>
+  </p:cSld>
+  <p:clrMapOvr>
+    <a:masterClrMapping/>
+  </p:clrMapOvr>
+</p:sld>
+</file>
+
+<file path=ppt/slides/slide14.xml><?xml version="1.0" encoding="utf-8"?>
+<p:sld xmlns:a="http://schemas.openxmlformats.org/drawingml/2006/main" xmlns:r="http://schemas.openxmlformats.org/officeDocument/2006/relationships" xmlns:p="http://schemas.openxmlformats.org/presentationml/2006/main">
+  <p:cSld>
+    <p:spTree>
+      <p:nvGrpSpPr>
+        <p:cNvPr id="1" name=""/>
+        <p:cNvGrpSpPr/>
+        <p:nvPr/>
+      </p:nvGrpSpPr>
+      <p:grpSpPr>
+        <a:xfrm>
+          <a:off x="0" y="0"/>
+          <a:ext cx="0" cy="0"/>
+          <a:chOff x="0" y="0"/>
+          <a:chExt cx="0" cy="0"/>
+        </a:xfrm>
+      </p:grpSpPr>
+      <p:sp>
+        <p:nvSpPr>
+          <p:cNvPr id="2" name="Title 1">
+            <a:extLst>
+              <a:ext uri="{FF2B5EF4-FFF2-40B4-BE49-F238E27FC236}">
+                <a16:creationId xmlns:a16="http://schemas.microsoft.com/office/drawing/2014/main" id="{48C7C7BF-D634-46B5-BC7D-E71F3F3A95A8}"/>
+              </a:ext>
+            </a:extLst>
+          </p:cNvPr>
+          <p:cNvSpPr>
+            <a:spLocks noGrp="1"/>
+          </p:cNvSpPr>
+          <p:nvPr>
+            <p:ph type="title"/>
+          </p:nvPr>
+        </p:nvSpPr>
+        <p:spPr/>
+        <p:txBody>
+          <a:bodyPr/>
+          <a:lstStyle/>
+          <a:p>
+            <a:pPr algn="ctr"/>
+            <a:r>
+              <a:rPr lang="en-US" dirty="0">
+                <a:cs typeface="Calibri Light"/>
+              </a:rPr>
+              <a:t>Detailed Methodology</a:t>
+            </a:r>
+          </a:p>
+        </p:txBody>
+      </p:sp>
+      <p:sp>
+        <p:nvSpPr>
+          <p:cNvPr id="3" name="Content Placeholder 2">
+            <a:extLst>
+              <a:ext uri="{FF2B5EF4-FFF2-40B4-BE49-F238E27FC236}">
+                <a16:creationId xmlns:a16="http://schemas.microsoft.com/office/drawing/2014/main" id="{D554E955-374B-44BD-AFC8-6585ED543466}"/>
+              </a:ext>
+            </a:extLst>
+          </p:cNvPr>
+          <p:cNvSpPr>
+            <a:spLocks noGrp="1"/>
+          </p:cNvSpPr>
+          <p:nvPr>
+            <p:ph idx="1"/>
+          </p:nvPr>
+        </p:nvSpPr>
+        <p:spPr/>
+        <p:txBody>
+          <a:bodyPr vert="horz" lIns="91440" tIns="45720" rIns="91440" bIns="45720" rtlCol="0" anchor="t">
+            <a:normAutofit/>
+          </a:bodyPr>
+          <a:lstStyle/>
+          <a:p>
+            <a:r>
+              <a:rPr lang="en-US" dirty="0">
+                <a:cs typeface="Calibri"/>
+              </a:rPr>
+              <a:t>The Neural Network</a:t>
+            </a:r>
+          </a:p>
+          <a:p>
+            <a:pPr lvl="1"/>
+            <a:r>
+              <a:rPr lang="en-US" dirty="0">
+                <a:cs typeface="Calibri"/>
+              </a:rPr>
+              <a:t>Convolutional Neural Networks are specialized neural networks that take in input as a 2D matrix. In the case of NLP, the input will be text data, this is converted into a sequence of numbers in the preprocessing section and used as input to the CNN. </a:t>
+            </a:r>
+          </a:p>
+          <a:p>
+            <a:pPr lvl="1"/>
+            <a:r>
+              <a:rPr lang="en-US" dirty="0">
+                <a:ea typeface="+mn-lt"/>
+                <a:cs typeface="+mn-lt"/>
+              </a:rPr>
+              <a:t>Each row of the matrix corresponds to one token, typically a word, but it could be a character. That is, each row is vector that represents a word.</a:t>
+            </a:r>
+          </a:p>
+          <a:p>
+            <a:pPr lvl="1"/>
+            <a:endParaRPr lang="en-US" dirty="0">
+              <a:cs typeface="Calibri"/>
+            </a:endParaRPr>
+          </a:p>
+        </p:txBody>
+      </p:sp>
+      <p:pic>
+        <p:nvPicPr>
+          <p:cNvPr id="4" name="Picture 4" descr="A picture containing crossword, clock&#10;&#10;Description generated with very high confidence">
+            <a:extLst>
+              <a:ext uri="{FF2B5EF4-FFF2-40B4-BE49-F238E27FC236}">
+                <a16:creationId xmlns:a16="http://schemas.microsoft.com/office/drawing/2014/main" id="{7C34FC55-9E1D-4711-BF6D-A583B6267261}"/>
+              </a:ext>
+            </a:extLst>
+          </p:cNvPr>
+          <p:cNvPicPr>
+            <a:picLocks noChangeAspect="1"/>
+          </p:cNvPicPr>
+          <p:nvPr/>
+        </p:nvPicPr>
+        <p:blipFill>
+          <a:blip r:embed="rId2"/>
+          <a:stretch>
+            <a:fillRect/>
+          </a:stretch>
+        </p:blipFill>
+        <p:spPr>
+          <a:xfrm>
+            <a:off x="3524250" y="4485080"/>
+            <a:ext cx="3257550" cy="2374115"/>
+          </a:xfrm>
+          <a:prstGeom prst="rect">
+            <a:avLst/>
+          </a:prstGeom>
+        </p:spPr>
+      </p:pic>
+    </p:spTree>
+    <p:extLst>
+      <p:ext uri="{BB962C8B-B14F-4D97-AF65-F5344CB8AC3E}">
+        <p14:creationId xmlns:p14="http://schemas.microsoft.com/office/powerpoint/2010/main" val="2902629462"/>
+      </p:ext>
+    </p:extLst>
+  </p:cSld>
+  <p:clrMapOvr>
+    <a:masterClrMapping/>
+  </p:clrMapOvr>
+</p:sld>
+</file>
+
+<file path=ppt/slides/slide15.xml><?xml version="1.0" encoding="utf-8"?>
+<p:sld xmlns:a="http://schemas.openxmlformats.org/drawingml/2006/main" xmlns:r="http://schemas.openxmlformats.org/officeDocument/2006/relationships" xmlns:p="http://schemas.openxmlformats.org/presentationml/2006/main">
+  <p:cSld>
+    <p:spTree>
+      <p:nvGrpSpPr>
+        <p:cNvPr id="1" name=""/>
+        <p:cNvGrpSpPr/>
+        <p:nvPr/>
+      </p:nvGrpSpPr>
+      <p:grpSpPr>
+        <a:xfrm>
+          <a:off x="0" y="0"/>
+          <a:ext cx="0" cy="0"/>
+          <a:chOff x="0" y="0"/>
+          <a:chExt cx="0" cy="0"/>
+        </a:xfrm>
+      </p:grpSpPr>
+      <p:sp>
+        <p:nvSpPr>
+          <p:cNvPr id="2" name="Title 1">
+            <a:extLst>
+              <a:ext uri="{FF2B5EF4-FFF2-40B4-BE49-F238E27FC236}">
+                <a16:creationId xmlns:a16="http://schemas.microsoft.com/office/drawing/2014/main" id="{EA55D31E-4E7C-4BAB-B34E-50C0C342A4E4}"/>
+              </a:ext>
+            </a:extLst>
+          </p:cNvPr>
+          <p:cNvSpPr>
+            <a:spLocks noGrp="1"/>
+          </p:cNvSpPr>
+          <p:nvPr>
+            <p:ph type="title"/>
+          </p:nvPr>
+        </p:nvSpPr>
+        <p:spPr/>
+        <p:txBody>
+          <a:bodyPr/>
+          <a:lstStyle/>
+          <a:p>
+            <a:pPr algn="ctr"/>
+            <a:r>
+              <a:rPr lang="en-US" dirty="0">
+                <a:cs typeface="Calibri Light" panose="020F0302020204030204"/>
+              </a:rPr>
+              <a:t>Detailed Methodology</a:t>
+            </a:r>
+          </a:p>
+        </p:txBody>
+      </p:sp>
+      <p:sp>
+        <p:nvSpPr>
+          <p:cNvPr id="3" name="Content Placeholder 2">
+            <a:extLst>
+              <a:ext uri="{FF2B5EF4-FFF2-40B4-BE49-F238E27FC236}">
+                <a16:creationId xmlns:a16="http://schemas.microsoft.com/office/drawing/2014/main" id="{82E3D54E-A396-47DF-BE45-4BAE98D141E4}"/>
+              </a:ext>
+            </a:extLst>
+          </p:cNvPr>
+          <p:cNvSpPr>
+            <a:spLocks noGrp="1"/>
+          </p:cNvSpPr>
+          <p:nvPr>
+            <p:ph idx="1"/>
+          </p:nvPr>
+        </p:nvSpPr>
+        <p:spPr/>
+        <p:txBody>
+          <a:bodyPr vert="horz" lIns="91440" tIns="45720" rIns="91440" bIns="45720" rtlCol="0" anchor="t">
+            <a:normAutofit fontScale="92500" lnSpcReduction="20000"/>
+          </a:bodyPr>
+          <a:lstStyle/>
+          <a:p>
+            <a:r>
+              <a:rPr lang="en-US" dirty="0">
+                <a:cs typeface="Calibri"/>
+              </a:rPr>
+              <a:t>LSTM (Long Short Term Memory)</a:t>
+            </a:r>
+          </a:p>
+          <a:p>
+            <a:pPr lvl="1"/>
+            <a:r>
+              <a:rPr lang="en-US" dirty="0">
+                <a:ea typeface="+mn-lt"/>
+                <a:cs typeface="+mn-lt"/>
+              </a:rPr>
+              <a:t>Sometimes, we only need to look at recent information to perform the present task. For example, consider a language model trying to predict the next word based on the previous ones. If we are trying to predict the last word in “the clouds are in the </a:t>
+            </a:r>
+            <a:r>
+              <a:rPr lang="en-US" i="1" dirty="0">
+                <a:ea typeface="+mn-lt"/>
+                <a:cs typeface="+mn-lt"/>
+              </a:rPr>
+              <a:t>sky</a:t>
+            </a:r>
+            <a:r>
+              <a:rPr lang="en-US" dirty="0">
+                <a:ea typeface="+mn-lt"/>
+                <a:cs typeface="+mn-lt"/>
+              </a:rPr>
+              <a:t>,” we don’t need any further context – it’s pretty obvious the next word is going to be sky. In such cases, where the gap between the relevant information and the place that it’s needed is small, RNNs can learn to use the past information.</a:t>
+            </a:r>
+          </a:p>
+          <a:p>
+            <a:pPr lvl="1" algn="just"/>
+            <a:r>
+              <a:rPr lang="en-US" dirty="0">
+                <a:ea typeface="+mn-lt"/>
+                <a:cs typeface="+mn-lt"/>
+              </a:rPr>
+              <a:t>But there are also cases where we need more context. Consider trying to predict the last word in the text “I grew up in France… I speak fluent </a:t>
+            </a:r>
+            <a:r>
+              <a:rPr lang="en-US" i="1" dirty="0">
+                <a:ea typeface="+mn-lt"/>
+                <a:cs typeface="+mn-lt"/>
+              </a:rPr>
+              <a:t>French</a:t>
+            </a:r>
+            <a:r>
+              <a:rPr lang="en-US" dirty="0">
+                <a:ea typeface="+mn-lt"/>
+                <a:cs typeface="+mn-lt"/>
+              </a:rPr>
+              <a:t>.” Recent information suggests that the next word is probably the name of a language, but if we want to narrow down which language, we need the context of France, from further back. It’s entirely possible for the gap between the relevant information and the point where it is needed to become very large.</a:t>
+            </a:r>
+            <a:endParaRPr lang="en-US" dirty="0">
+              <a:cs typeface="Calibri"/>
+            </a:endParaRPr>
+          </a:p>
+          <a:p>
+            <a:pPr lvl="1" algn="just"/>
+            <a:r>
+              <a:rPr lang="en-US" dirty="0">
+                <a:ea typeface="+mn-lt"/>
+                <a:cs typeface="+mn-lt"/>
+              </a:rPr>
+              <a:t>Unfortunately, as that gap grows, RNNs become unable to learn to connect the information.</a:t>
+            </a:r>
+            <a:endParaRPr lang="en-US" dirty="0"/>
+          </a:p>
+        </p:txBody>
+      </p:sp>
+    </p:spTree>
+    <p:extLst>
+      <p:ext uri="{BB962C8B-B14F-4D97-AF65-F5344CB8AC3E}">
+        <p14:creationId xmlns:p14="http://schemas.microsoft.com/office/powerpoint/2010/main" val="4080191169"/>
+      </p:ext>
+    </p:extLst>
+  </p:cSld>
+  <p:clrMapOvr>
+    <a:masterClrMapping/>
+  </p:clrMapOvr>
+</p:sld>
+</file>
+
+<file path=ppt/slides/slide16.xml><?xml version="1.0" encoding="utf-8"?>
+<p:sld xmlns:a="http://schemas.openxmlformats.org/drawingml/2006/main" xmlns:r="http://schemas.openxmlformats.org/officeDocument/2006/relationships" xmlns:p="http://schemas.openxmlformats.org/presentationml/2006/main">
+  <p:cSld>
+    <p:spTree>
+      <p:nvGrpSpPr>
+        <p:cNvPr id="1" name=""/>
+        <p:cNvGrpSpPr/>
+        <p:nvPr/>
+      </p:nvGrpSpPr>
+      <p:grpSpPr>
+        <a:xfrm>
+          <a:off x="0" y="0"/>
+          <a:ext cx="0" cy="0"/>
+          <a:chOff x="0" y="0"/>
+          <a:chExt cx="0" cy="0"/>
+        </a:xfrm>
+      </p:grpSpPr>
+      <p:sp>
+        <p:nvSpPr>
+          <p:cNvPr id="2" name="Title 1">
+            <a:extLst>
+              <a:ext uri="{FF2B5EF4-FFF2-40B4-BE49-F238E27FC236}">
+                <a16:creationId xmlns:a16="http://schemas.microsoft.com/office/drawing/2014/main" id="{EA55D31E-4E7C-4BAB-B34E-50C0C342A4E4}"/>
+              </a:ext>
+            </a:extLst>
+          </p:cNvPr>
+          <p:cNvSpPr>
+            <a:spLocks noGrp="1"/>
+          </p:cNvSpPr>
+          <p:nvPr>
+            <p:ph type="title"/>
+          </p:nvPr>
+        </p:nvSpPr>
+        <p:spPr/>
+        <p:txBody>
+          <a:bodyPr/>
+          <a:lstStyle/>
+          <a:p>
+            <a:pPr algn="ctr"/>
+            <a:r>
+              <a:rPr lang="en-US" dirty="0">
+                <a:cs typeface="Calibri Light" panose="020F0302020204030204"/>
+              </a:rPr>
+              <a:t>Detailed Methodology</a:t>
+            </a:r>
+          </a:p>
+        </p:txBody>
+      </p:sp>
+      <p:sp>
+        <p:nvSpPr>
+          <p:cNvPr id="3" name="Content Placeholder 2">
+            <a:extLst>
+              <a:ext uri="{FF2B5EF4-FFF2-40B4-BE49-F238E27FC236}">
+                <a16:creationId xmlns:a16="http://schemas.microsoft.com/office/drawing/2014/main" id="{82E3D54E-A396-47DF-BE45-4BAE98D141E4}"/>
+              </a:ext>
+            </a:extLst>
+          </p:cNvPr>
+          <p:cNvSpPr>
+            <a:spLocks noGrp="1"/>
+          </p:cNvSpPr>
+          <p:nvPr>
+            <p:ph idx="1"/>
+          </p:nvPr>
+        </p:nvSpPr>
+        <p:spPr/>
+        <p:txBody>
+          <a:bodyPr vert="horz" lIns="91440" tIns="45720" rIns="91440" bIns="45720" rtlCol="0" anchor="t">
+            <a:normAutofit/>
+          </a:bodyPr>
+          <a:lstStyle/>
+          <a:p>
+            <a:r>
+              <a:rPr lang="en-US" dirty="0">
+                <a:cs typeface="Calibri"/>
+              </a:rPr>
+              <a:t>LSTM (Long Short Term Memory)</a:t>
+            </a:r>
+          </a:p>
+          <a:p>
+            <a:pPr lvl="1"/>
+            <a:r>
+              <a:rPr lang="en-US" dirty="0">
+                <a:ea typeface="+mn-lt"/>
+                <a:cs typeface="+mn-lt"/>
+              </a:rPr>
+              <a:t>LSTMs are explicitly designed to avoid the long-term dependency problem. Remembering information for long periods of time is practically their default behavior, not something they struggle to learn.</a:t>
+            </a:r>
+          </a:p>
+          <a:p>
+            <a:pPr lvl="1"/>
+            <a:endParaRPr lang="en-US" dirty="0">
+              <a:cs typeface="Calibri"/>
+            </a:endParaRPr>
+          </a:p>
+        </p:txBody>
+      </p:sp>
+      <p:pic>
+        <p:nvPicPr>
+          <p:cNvPr id="4" name="Picture 4" descr="A close up of a logo&#10;&#10;Description generated with very high confidence">
+            <a:extLst>
+              <a:ext uri="{FF2B5EF4-FFF2-40B4-BE49-F238E27FC236}">
+                <a16:creationId xmlns:a16="http://schemas.microsoft.com/office/drawing/2014/main" id="{5A8E4678-E3CE-470E-9095-26FAA59B09C9}"/>
+              </a:ext>
+            </a:extLst>
+          </p:cNvPr>
+          <p:cNvPicPr>
+            <a:picLocks noChangeAspect="1"/>
+          </p:cNvPicPr>
+          <p:nvPr/>
+        </p:nvPicPr>
+        <p:blipFill>
+          <a:blip r:embed="rId2"/>
+          <a:stretch>
+            <a:fillRect/>
+          </a:stretch>
+        </p:blipFill>
+        <p:spPr>
+          <a:xfrm>
+            <a:off x="2200275" y="3681626"/>
+            <a:ext cx="6981825" cy="2142697"/>
+          </a:xfrm>
+          <a:prstGeom prst="rect">
+            <a:avLst/>
+          </a:prstGeom>
+        </p:spPr>
+      </p:pic>
+    </p:spTree>
+    <p:extLst>
+      <p:ext uri="{BB962C8B-B14F-4D97-AF65-F5344CB8AC3E}">
+        <p14:creationId xmlns:p14="http://schemas.microsoft.com/office/powerpoint/2010/main" val="1917577779"/>
+      </p:ext>
+    </p:extLst>
+  </p:cSld>
+  <p:clrMapOvr>
+    <a:masterClrMapping/>
+  </p:clrMapOvr>
+</p:sld>
+</file>
+
+<file path=ppt/slides/slide17.xml><?xml version="1.0" encoding="utf-8"?>
+<p:sld xmlns:a="http://schemas.openxmlformats.org/drawingml/2006/main" xmlns:r="http://schemas.openxmlformats.org/officeDocument/2006/relationships" xmlns:p="http://schemas.openxmlformats.org/presentationml/2006/main">
+  <p:cSld>
+    <p:spTree>
+      <p:nvGrpSpPr>
+        <p:cNvPr id="1" name=""/>
+        <p:cNvGrpSpPr/>
+        <p:nvPr/>
+      </p:nvGrpSpPr>
+      <p:grpSpPr>
+        <a:xfrm>
+          <a:off x="0" y="0"/>
+          <a:ext cx="0" cy="0"/>
+          <a:chOff x="0" y="0"/>
+          <a:chExt cx="0" cy="0"/>
+        </a:xfrm>
+      </p:grpSpPr>
+      <p:sp>
+        <p:nvSpPr>
+          <p:cNvPr id="3" name="TextBox 2">
+            <a:extLst>
+              <a:ext uri="{FF2B5EF4-FFF2-40B4-BE49-F238E27FC236}">
+                <a16:creationId xmlns:a16="http://schemas.microsoft.com/office/drawing/2014/main" id="{900F47E2-996A-4093-B753-EB3793C2C685}"/>
+              </a:ext>
+            </a:extLst>
+          </p:cNvPr>
+          <p:cNvSpPr txBox="1"/>
+          <p:nvPr/>
+        </p:nvSpPr>
+        <p:spPr>
+          <a:xfrm>
+            <a:off x="302142" y="128034"/>
+            <a:ext cx="4576651" cy="369332"/>
+          </a:xfrm>
+          <a:prstGeom prst="rect">
+            <a:avLst/>
+          </a:prstGeom>
+          <a:noFill/>
+        </p:spPr>
+        <p:txBody>
+          <a:bodyPr rot="0" spcFirstLastPara="0" vert="horz" wrap="square" lIns="91440" tIns="45720" rIns="91440" bIns="45720" numCol="1" spcCol="0" rtlCol="0" fromWordArt="0" anchor="t" anchorCtr="0" forceAA="0" compatLnSpc="1">
+            <a:prstTxWarp prst="textNoShape">
+              <a:avLst/>
+            </a:prstTxWarp>
+            <a:spAutoFit/>
+          </a:bodyPr>
+          <a:lstStyle>
+            <a:defPPr>
+              <a:defRPr lang="en-US"/>
+            </a:defPPr>
+            <a:lvl1pPr marL="0" algn="l" defTabSz="914400" rtl="0" eaLnBrk="1" latinLnBrk="0" hangingPunct="1">
+              <a:defRPr sz="1800" kern="1200">
+                <a:solidFill>
+                  <a:schemeClr val="tx1"/>
+                </a:solidFill>
+                <a:latin typeface="+mn-lt"/>
+                <a:ea typeface="+mn-ea"/>
+                <a:cs typeface="+mn-cs"/>
+              </a:defRPr>
+            </a:lvl1pPr>
+            <a:lvl2pPr marL="457200" algn="l" defTabSz="914400" rtl="0" eaLnBrk="1" latinLnBrk="0" hangingPunct="1">
+              <a:defRPr sz="1800" kern="1200">
+                <a:solidFill>
+                  <a:schemeClr val="tx1"/>
+                </a:solidFill>
+                <a:latin typeface="+mn-lt"/>
+                <a:ea typeface="+mn-ea"/>
+                <a:cs typeface="+mn-cs"/>
+              </a:defRPr>
+            </a:lvl2pPr>
+            <a:lvl3pPr marL="914400" algn="l" defTabSz="914400" rtl="0" eaLnBrk="1" latinLnBrk="0" hangingPunct="1">
+              <a:defRPr sz="1800" kern="1200">
+                <a:solidFill>
+                  <a:schemeClr val="tx1"/>
+                </a:solidFill>
+                <a:latin typeface="+mn-lt"/>
+                <a:ea typeface="+mn-ea"/>
+                <a:cs typeface="+mn-cs"/>
+              </a:defRPr>
+            </a:lvl3pPr>
+            <a:lvl4pPr marL="1371600" algn="l" defTabSz="914400" rtl="0" eaLnBrk="1" latinLnBrk="0" hangingPunct="1">
+              <a:defRPr sz="1800" kern="1200">
+                <a:solidFill>
+                  <a:schemeClr val="tx1"/>
+                </a:solidFill>
+                <a:latin typeface="+mn-lt"/>
+                <a:ea typeface="+mn-ea"/>
+                <a:cs typeface="+mn-cs"/>
+              </a:defRPr>
+            </a:lvl4pPr>
+            <a:lvl5pPr marL="1828800" algn="l" defTabSz="914400" rtl="0" eaLnBrk="1" latinLnBrk="0" hangingPunct="1">
+              <a:defRPr sz="1800" kern="1200">
+                <a:solidFill>
+                  <a:schemeClr val="tx1"/>
+                </a:solidFill>
+                <a:latin typeface="+mn-lt"/>
+                <a:ea typeface="+mn-ea"/>
+                <a:cs typeface="+mn-cs"/>
+              </a:defRPr>
+            </a:lvl5pPr>
+            <a:lvl6pPr marL="2286000" algn="l" defTabSz="914400" rtl="0" eaLnBrk="1" latinLnBrk="0" hangingPunct="1">
+              <a:defRPr sz="1800" kern="1200">
+                <a:solidFill>
+                  <a:schemeClr val="tx1"/>
+                </a:solidFill>
+                <a:latin typeface="+mn-lt"/>
+                <a:ea typeface="+mn-ea"/>
+                <a:cs typeface="+mn-cs"/>
+              </a:defRPr>
+            </a:lvl6pPr>
+            <a:lvl7pPr marL="2743200" algn="l" defTabSz="914400" rtl="0" eaLnBrk="1" latinLnBrk="0" hangingPunct="1">
+              <a:defRPr sz="1800" kern="1200">
+                <a:solidFill>
+                  <a:schemeClr val="tx1"/>
+                </a:solidFill>
+                <a:latin typeface="+mn-lt"/>
+                <a:ea typeface="+mn-ea"/>
+                <a:cs typeface="+mn-cs"/>
+              </a:defRPr>
+            </a:lvl7pPr>
+            <a:lvl8pPr marL="3200400" algn="l" defTabSz="914400" rtl="0" eaLnBrk="1" latinLnBrk="0" hangingPunct="1">
+              <a:defRPr sz="1800" kern="1200">
+                <a:solidFill>
+                  <a:schemeClr val="tx1"/>
+                </a:solidFill>
+                <a:latin typeface="+mn-lt"/>
+                <a:ea typeface="+mn-ea"/>
+                <a:cs typeface="+mn-cs"/>
+              </a:defRPr>
+            </a:lvl8pPr>
+            <a:lvl9pPr marL="3657600" algn="l" defTabSz="914400" rtl="0" eaLnBrk="1" latinLnBrk="0" hangingPunct="1">
+              <a:defRPr sz="1800" kern="1200">
+                <a:solidFill>
+                  <a:schemeClr val="tx1"/>
+                </a:solidFill>
+                <a:latin typeface="+mn-lt"/>
+                <a:ea typeface="+mn-ea"/>
+                <a:cs typeface="+mn-cs"/>
+              </a:defRPr>
+            </a:lvl9pPr>
+          </a:lstStyle>
+          <a:p>
+            <a:r>
+              <a:rPr lang="en-US" dirty="0"/>
+              <a:t>Model Generation – Sentiment Analysis Model</a:t>
+            </a:r>
+            <a:endParaRPr lang="en-US" dirty="0">
+              <a:cs typeface="Calibri"/>
+            </a:endParaRPr>
+          </a:p>
+        </p:txBody>
+      </p:sp>
+      <p:pic>
+        <p:nvPicPr>
+          <p:cNvPr id="4" name="Picture 4" descr="A screenshot of a cell phone&#10;&#10;Description generated with very high confidence">
+            <a:extLst>
+              <a:ext uri="{FF2B5EF4-FFF2-40B4-BE49-F238E27FC236}">
+                <a16:creationId xmlns:a16="http://schemas.microsoft.com/office/drawing/2014/main" id="{4B8034ED-FD4E-4E94-B6B9-B2215E325447}"/>
+              </a:ext>
+            </a:extLst>
+          </p:cNvPr>
+          <p:cNvPicPr>
+            <a:picLocks noChangeAspect="1"/>
+          </p:cNvPicPr>
+          <p:nvPr/>
+        </p:nvPicPr>
+        <p:blipFill>
+          <a:blip r:embed="rId2"/>
+          <a:stretch>
+            <a:fillRect/>
+          </a:stretch>
+        </p:blipFill>
+        <p:spPr>
+          <a:xfrm>
+            <a:off x="304800" y="589911"/>
+            <a:ext cx="4895850" cy="6059179"/>
+          </a:xfrm>
+          <a:prstGeom prst="rect">
+            <a:avLst/>
+          </a:prstGeom>
+        </p:spPr>
+      </p:pic>
+      <p:sp>
+        <p:nvSpPr>
+          <p:cNvPr id="6" name="TextBox 5">
+            <a:extLst>
+              <a:ext uri="{FF2B5EF4-FFF2-40B4-BE49-F238E27FC236}">
+                <a16:creationId xmlns:a16="http://schemas.microsoft.com/office/drawing/2014/main" id="{E91D52DD-31FD-4CED-A2FF-D1B65ABB87BE}"/>
+              </a:ext>
+            </a:extLst>
+          </p:cNvPr>
+          <p:cNvSpPr txBox="1"/>
+          <p:nvPr/>
+        </p:nvSpPr>
+        <p:spPr>
+          <a:xfrm>
+            <a:off x="8884166" y="128034"/>
+            <a:ext cx="2957401" cy="369332"/>
+          </a:xfrm>
+          <a:prstGeom prst="rect">
+            <a:avLst/>
+          </a:prstGeom>
+          <a:noFill/>
+        </p:spPr>
+        <p:txBody>
+          <a:bodyPr rot="0" spcFirstLastPara="0" vert="horz" wrap="square" lIns="91440" tIns="45720" rIns="91440" bIns="45720" numCol="1" spcCol="0" rtlCol="0" fromWordArt="0" anchor="t" anchorCtr="0" forceAA="0" compatLnSpc="1">
+            <a:prstTxWarp prst="textNoShape">
+              <a:avLst/>
+            </a:prstTxWarp>
+            <a:spAutoFit/>
+          </a:bodyPr>
+          <a:lstStyle>
+            <a:defPPr>
+              <a:defRPr lang="en-US"/>
+            </a:defPPr>
+            <a:lvl1pPr marL="0" algn="l" defTabSz="914400" rtl="0" eaLnBrk="1" latinLnBrk="0" hangingPunct="1">
+              <a:defRPr sz="1800" kern="1200">
+                <a:solidFill>
+                  <a:schemeClr val="tx1"/>
+                </a:solidFill>
+                <a:latin typeface="+mn-lt"/>
+                <a:ea typeface="+mn-ea"/>
+                <a:cs typeface="+mn-cs"/>
+              </a:defRPr>
+            </a:lvl1pPr>
+            <a:lvl2pPr marL="457200" algn="l" defTabSz="914400" rtl="0" eaLnBrk="1" latinLnBrk="0" hangingPunct="1">
+              <a:defRPr sz="1800" kern="1200">
+                <a:solidFill>
+                  <a:schemeClr val="tx1"/>
+                </a:solidFill>
+                <a:latin typeface="+mn-lt"/>
+                <a:ea typeface="+mn-ea"/>
+                <a:cs typeface="+mn-cs"/>
+              </a:defRPr>
+            </a:lvl2pPr>
+            <a:lvl3pPr marL="914400" algn="l" defTabSz="914400" rtl="0" eaLnBrk="1" latinLnBrk="0" hangingPunct="1">
+              <a:defRPr sz="1800" kern="1200">
+                <a:solidFill>
+                  <a:schemeClr val="tx1"/>
+                </a:solidFill>
+                <a:latin typeface="+mn-lt"/>
+                <a:ea typeface="+mn-ea"/>
+                <a:cs typeface="+mn-cs"/>
+              </a:defRPr>
+            </a:lvl3pPr>
+            <a:lvl4pPr marL="1371600" algn="l" defTabSz="914400" rtl="0" eaLnBrk="1" latinLnBrk="0" hangingPunct="1">
+              <a:defRPr sz="1800" kern="1200">
+                <a:solidFill>
+                  <a:schemeClr val="tx1"/>
+                </a:solidFill>
+                <a:latin typeface="+mn-lt"/>
+                <a:ea typeface="+mn-ea"/>
+                <a:cs typeface="+mn-cs"/>
+              </a:defRPr>
+            </a:lvl4pPr>
+            <a:lvl5pPr marL="1828800" algn="l" defTabSz="914400" rtl="0" eaLnBrk="1" latinLnBrk="0" hangingPunct="1">
+              <a:defRPr sz="1800" kern="1200">
+                <a:solidFill>
+                  <a:schemeClr val="tx1"/>
+                </a:solidFill>
+                <a:latin typeface="+mn-lt"/>
+                <a:ea typeface="+mn-ea"/>
+                <a:cs typeface="+mn-cs"/>
+              </a:defRPr>
+            </a:lvl5pPr>
+            <a:lvl6pPr marL="2286000" algn="l" defTabSz="914400" rtl="0" eaLnBrk="1" latinLnBrk="0" hangingPunct="1">
+              <a:defRPr sz="1800" kern="1200">
+                <a:solidFill>
+                  <a:schemeClr val="tx1"/>
+                </a:solidFill>
+                <a:latin typeface="+mn-lt"/>
+                <a:ea typeface="+mn-ea"/>
+                <a:cs typeface="+mn-cs"/>
+              </a:defRPr>
+            </a:lvl6pPr>
+            <a:lvl7pPr marL="2743200" algn="l" defTabSz="914400" rtl="0" eaLnBrk="1" latinLnBrk="0" hangingPunct="1">
+              <a:defRPr sz="1800" kern="1200">
+                <a:solidFill>
+                  <a:schemeClr val="tx1"/>
+                </a:solidFill>
+                <a:latin typeface="+mn-lt"/>
+                <a:ea typeface="+mn-ea"/>
+                <a:cs typeface="+mn-cs"/>
+              </a:defRPr>
+            </a:lvl7pPr>
+            <a:lvl8pPr marL="3200400" algn="l" defTabSz="914400" rtl="0" eaLnBrk="1" latinLnBrk="0" hangingPunct="1">
+              <a:defRPr sz="1800" kern="1200">
+                <a:solidFill>
+                  <a:schemeClr val="tx1"/>
+                </a:solidFill>
+                <a:latin typeface="+mn-lt"/>
+                <a:ea typeface="+mn-ea"/>
+                <a:cs typeface="+mn-cs"/>
+              </a:defRPr>
+            </a:lvl8pPr>
+            <a:lvl9pPr marL="3657600" algn="l" defTabSz="914400" rtl="0" eaLnBrk="1" latinLnBrk="0" hangingPunct="1">
+              <a:defRPr sz="1800" kern="1200">
+                <a:solidFill>
+                  <a:schemeClr val="tx1"/>
+                </a:solidFill>
+                <a:latin typeface="+mn-lt"/>
+                <a:ea typeface="+mn-ea"/>
+                <a:cs typeface="+mn-cs"/>
+              </a:defRPr>
+            </a:lvl9pPr>
+          </a:lstStyle>
+          <a:p>
+            <a:r>
+              <a:rPr lang="en-US" dirty="0"/>
+              <a:t>Category Classification Model</a:t>
+            </a:r>
+            <a:endParaRPr lang="en-US" dirty="0">
+              <a:cs typeface="Calibri"/>
+            </a:endParaRPr>
+          </a:p>
+        </p:txBody>
+      </p:sp>
+      <p:pic>
+        <p:nvPicPr>
+          <p:cNvPr id="7" name="Picture 7" descr="A screenshot of a cell phone&#10;&#10;Description generated with very high confidence">
+            <a:extLst>
+              <a:ext uri="{FF2B5EF4-FFF2-40B4-BE49-F238E27FC236}">
+                <a16:creationId xmlns:a16="http://schemas.microsoft.com/office/drawing/2014/main" id="{77872856-6500-4B12-944A-D20AB603D9B0}"/>
+              </a:ext>
+            </a:extLst>
+          </p:cNvPr>
+          <p:cNvPicPr>
+            <a:picLocks noChangeAspect="1"/>
+          </p:cNvPicPr>
+          <p:nvPr/>
+        </p:nvPicPr>
+        <p:blipFill>
+          <a:blip r:embed="rId3"/>
+          <a:stretch>
+            <a:fillRect/>
+          </a:stretch>
+        </p:blipFill>
+        <p:spPr>
+          <a:xfrm>
+            <a:off x="6800850" y="589322"/>
+            <a:ext cx="5038725" cy="6060355"/>
+          </a:xfrm>
+          <a:prstGeom prst="rect">
+            <a:avLst/>
+          </a:prstGeom>
+        </p:spPr>
+      </p:pic>
+    </p:spTree>
+    <p:extLst>
+      <p:ext uri="{BB962C8B-B14F-4D97-AF65-F5344CB8AC3E}">
+        <p14:creationId xmlns:p14="http://schemas.microsoft.com/office/powerpoint/2010/main" val="283725290"/>
+      </p:ext>
+    </p:extLst>
+  </p:cSld>
+  <p:clrMapOvr>
+    <a:masterClrMapping/>
+  </p:clrMapOvr>
+</p:sld>
+</file>
+
+<file path=ppt/slides/slide18.xml><?xml version="1.0" encoding="utf-8"?>
+<p:sld xmlns:a="http://schemas.openxmlformats.org/drawingml/2006/main" xmlns:r="http://schemas.openxmlformats.org/officeDocument/2006/relationships" xmlns:p="http://schemas.openxmlformats.org/presentationml/2006/main">
+  <p:cSld>
+    <p:spTree>
+      <p:nvGrpSpPr>
+        <p:cNvPr id="1" name=""/>
+        <p:cNvGrpSpPr/>
+        <p:nvPr/>
+      </p:nvGrpSpPr>
+      <p:grpSpPr>
+        <a:xfrm>
+          <a:off x="0" y="0"/>
+          <a:ext cx="0" cy="0"/>
+          <a:chOff x="0" y="0"/>
+          <a:chExt cx="0" cy="0"/>
+        </a:xfrm>
+      </p:grpSpPr>
+      <p:sp>
+        <p:nvSpPr>
           <p:cNvPr id="2" name="Title 1">
             <a:extLst>
               <a:ext uri="{FF2B5EF4-FFF2-40B4-BE49-F238E27FC236}">
@@ -3536,7 +4874,7 @@
 </p:sld>
 </file>
 
-<file path=ppt/slides/slide12.xml><?xml version="1.0" encoding="utf-8"?>
+<file path=ppt/slides/slide19.xml><?xml version="1.0" encoding="utf-8"?>
 <p:sld xmlns:a="http://schemas.openxmlformats.org/drawingml/2006/main" xmlns:r="http://schemas.openxmlformats.org/officeDocument/2006/relationships" xmlns:p="http://schemas.openxmlformats.org/presentationml/2006/main">
   <p:cSld>
     <p:spTree>
@@ -3955,7 +5293,7 @@
         <p:spPr/>
         <p:txBody>
           <a:bodyPr vert="horz" lIns="91440" tIns="45720" rIns="91440" bIns="45720" rtlCol="0" anchor="t">
-            <a:normAutofit/>
+            <a:normAutofit fontScale="92500" lnSpcReduction="10000"/>
           </a:bodyPr>
           <a:lstStyle/>
           <a:p>
@@ -3976,57 +5314,78 @@
               </a:rPr>
               <a:t>Text classification is a very important task in supervised machine learning.</a:t>
             </a:r>
+          </a:p>
+          <a:p>
+            <a:pPr lvl="1" algn="just"/>
+            <a:r>
+              <a:rPr lang="en-US" dirty="0">
+                <a:cs typeface="Calibri"/>
+              </a:rPr>
+              <a:t>A piece of text is assigned to one or more classes or categories. This can be done either manually or using ML algorithms.</a:t>
+            </a:r>
+          </a:p>
+          <a:p>
+            <a:pPr lvl="1" algn="just"/>
+            <a:r>
+              <a:rPr lang="en-US" dirty="0">
+                <a:cs typeface="Calibri"/>
+              </a:rPr>
+              <a:t>Context Analyzer uses one such ML algorithm so solve this classification problem.</a:t>
+            </a:r>
+          </a:p>
+          <a:p>
+            <a:pPr lvl="1" algn="just"/>
+            <a:r>
+              <a:rPr lang="en-US" dirty="0">
+                <a:cs typeface="Calibri"/>
+              </a:rPr>
+              <a:t>The best way to build APIs currently is to use an efficient language like JavaScript with its Node.js runtime. The integration of Tensorflow.js with Node.js allows us to build highly scalable and robust APIs.</a:t>
+            </a:r>
+          </a:p>
+          <a:p>
+            <a:pPr algn="just"/>
+            <a:r>
+              <a:rPr lang="en-US" u="sng" dirty="0">
+                <a:ea typeface="+mn-lt"/>
+                <a:cs typeface="+mn-lt"/>
+              </a:rPr>
+              <a:t>Scope:</a:t>
+            </a:r>
             <a:endParaRPr lang="en-US">
-              <a:cs typeface="Calibri"/>
+              <a:ea typeface="+mn-lt"/>
+              <a:cs typeface="+mn-lt"/>
             </a:endParaRPr>
           </a:p>
           <a:p>
             <a:pPr lvl="1" algn="just"/>
             <a:r>
               <a:rPr lang="en-US" dirty="0">
-                <a:cs typeface="Calibri"/>
-              </a:rPr>
-              <a:t>Assigning categories to documents like web pages, books, articles, </a:t>
-            </a:r>
-            <a:r>
-              <a:rPr lang="en-US" dirty="0" err="1">
-                <a:cs typeface="Calibri"/>
-              </a:rPr>
-              <a:t>etc</a:t>
-            </a:r>
-            <a:r>
-              <a:rPr lang="en-US" dirty="0">
-                <a:cs typeface="Calibri"/>
-              </a:rPr>
-              <a:t> has many applications like spam filtering, email routing, sentiment analysis.</a:t>
+                <a:ea typeface="+mn-lt"/>
+                <a:cs typeface="+mn-lt"/>
+              </a:rPr>
+              <a:t>The application provides text classification services through APIs.</a:t>
             </a:r>
           </a:p>
           <a:p>
             <a:pPr lvl="1" algn="just"/>
             <a:r>
               <a:rPr lang="en-US" dirty="0">
-                <a:cs typeface="Calibri"/>
-              </a:rPr>
-              <a:t>A piece of text is assigned to one or more classes or categories. This can be done either manually or using ML algorithms.</a:t>
+                <a:ea typeface="+mn-lt"/>
+                <a:cs typeface="+mn-lt"/>
+              </a:rPr>
+              <a:t>Sentiment analysis can be done on data from social media platforms, reviews on things like movies, food, productions on an online store etc..</a:t>
             </a:r>
           </a:p>
           <a:p>
             <a:pPr lvl="1" algn="just"/>
             <a:r>
               <a:rPr lang="en-US" dirty="0">
-                <a:cs typeface="Calibri"/>
-              </a:rPr>
-              <a:t>Context Analyzer uses one such ML algorithm so solve this classification problem.</a:t>
-            </a:r>
-          </a:p>
-          <a:p>
-            <a:pPr lvl="1" algn="just"/>
-            <a:r>
-              <a:rPr lang="en-US" dirty="0">
-                <a:cs typeface="Calibri"/>
-              </a:rPr>
-              <a:t>The best way to build APIs currently is to use an efficient language like JavaScript with its Node.js runtime. The integration of Tensorflow.js with Node.js allows us to build highly scalable and robust APIs.</a:t>
-            </a:r>
+                <a:ea typeface="+mn-lt"/>
+                <a:cs typeface="+mn-lt"/>
+              </a:rPr>
+              <a:t>Multi-class classification can be done on news articles, articles related to technology.</a:t>
+            </a:r>
+            <a:endParaRPr lang="en-US"/>
           </a:p>
         </p:txBody>
       </p:sp>
@@ -4065,7 +5424,7 @@
           <p:cNvPr id="2" name="Title 1">
             <a:extLst>
               <a:ext uri="{FF2B5EF4-FFF2-40B4-BE49-F238E27FC236}">
-                <a16:creationId xmlns:a16="http://schemas.microsoft.com/office/drawing/2014/main" id="{BEA02F87-4406-4AE7-80D8-B38B389B8AF2}"/>
+                <a16:creationId xmlns:a16="http://schemas.microsoft.com/office/drawing/2014/main" id="{C603E5F4-7E03-4E91-9A58-BA2D31F6C255}"/>
               </a:ext>
             </a:extLst>
           </p:cNvPr>
@@ -4083,10 +5442,10 @@
           <a:p>
             <a:pPr algn="ctr"/>
             <a:r>
-              <a:rPr lang="en-US" dirty="0">
-                <a:cs typeface="Calibri Light"/>
-              </a:rPr>
-              <a:t>Introduction</a:t>
+              <a:rPr lang="en-US">
+                <a:cs typeface="Calibri Light" panose="020F0302020204030204"/>
+              </a:rPr>
+              <a:t>Literature Survey</a:t>
             </a:r>
           </a:p>
         </p:txBody>
@@ -4096,7 +5455,7 @@
           <p:cNvPr id="3" name="Content Placeholder 2">
             <a:extLst>
               <a:ext uri="{FF2B5EF4-FFF2-40B4-BE49-F238E27FC236}">
-                <a16:creationId xmlns:a16="http://schemas.microsoft.com/office/drawing/2014/main" id="{DE3E18F3-CBA2-4749-A22C-66CC458D344C}"/>
+                <a16:creationId xmlns:a16="http://schemas.microsoft.com/office/drawing/2014/main" id="{082142D9-7288-44D9-B983-9EC873349898}"/>
               </a:ext>
             </a:extLst>
           </p:cNvPr>
@@ -4116,67 +5475,46 @@
           <a:p>
             <a:pPr algn="just"/>
             <a:r>
-              <a:rPr lang="en-US" u="sng" dirty="0">
-                <a:cs typeface="Calibri"/>
-              </a:rPr>
-              <a:t>Scope:</a:t>
-            </a:r>
-            <a:endParaRPr lang="en-US" dirty="0">
-              <a:cs typeface="Calibri"/>
-            </a:endParaRPr>
-          </a:p>
-          <a:p>
-            <a:pPr lvl="1" algn="just"/>
-            <a:r>
-              <a:rPr lang="en-US" dirty="0">
-                <a:ea typeface="+mn-lt"/>
-                <a:cs typeface="+mn-lt"/>
-              </a:rPr>
-              <a:t>Context Analyzer provides NLP APIs for the most important text classification tasks.</a:t>
-            </a:r>
-          </a:p>
-          <a:p>
-            <a:pPr lvl="1" algn="just"/>
-            <a:r>
-              <a:rPr lang="en-US" dirty="0">
-                <a:ea typeface="+mn-lt"/>
-                <a:cs typeface="+mn-lt"/>
-              </a:rPr>
-              <a:t>The Multi-class classification API takes text data as input and returns a probability score. The text data is assigned to the class with the highest value.</a:t>
-            </a:r>
-          </a:p>
-          <a:p>
-            <a:pPr lvl="1" algn="just"/>
-            <a:r>
-              <a:rPr lang="en-US" dirty="0">
-                <a:ea typeface="+mn-lt"/>
-                <a:cs typeface="+mn-lt"/>
-              </a:rPr>
-              <a:t>The Sentiment analysis API takes text data as input and returns a probability score that can be used to find out if a person's opinion on something is positive or negative.</a:t>
-            </a:r>
-          </a:p>
-          <a:p>
-            <a:pPr lvl="1" algn="just"/>
-            <a:r>
-              <a:rPr lang="en-US" dirty="0">
-                <a:ea typeface="+mn-lt"/>
-                <a:cs typeface="+mn-lt"/>
-              </a:rPr>
-              <a:t>For tech related text inputs, the API also tells us what particular technologies are being mentioned.</a:t>
-            </a:r>
-          </a:p>
-          <a:p>
-            <a:pPr lvl="1"/>
-            <a:endParaRPr lang="en-US" u="sng" dirty="0">
-              <a:cs typeface="Calibri"/>
-            </a:endParaRPr>
+              <a:rPr lang="en-US" dirty="0">
+                <a:cs typeface="Calibri"/>
+              </a:rPr>
+              <a:t>A lot of research is being done every day in NLP. Providing NLP APIs is a complex task.</a:t>
+            </a:r>
+            <a:endParaRPr lang="en-US"/>
+          </a:p>
+          <a:p>
+            <a:pPr algn="just"/>
+            <a:r>
+              <a:rPr lang="en-US" dirty="0">
+                <a:cs typeface="Calibri"/>
+              </a:rPr>
+              <a:t>Tensorflow.js with Node.js can be used to build such APIs.</a:t>
+            </a:r>
+          </a:p>
+          <a:p>
+            <a:pPr algn="just"/>
+            <a:r>
+              <a:rPr lang="en-US" dirty="0">
+                <a:cs typeface="Calibri"/>
+              </a:rPr>
+              <a:t>Tensorflow.js allows us to interact with ML models directly from the browser. This is what makes it currently the best library for building NLP APIs.</a:t>
+            </a:r>
+          </a:p>
+          <a:p>
+            <a:pPr algn="just"/>
+            <a:r>
+              <a:rPr lang="en-US" dirty="0">
+                <a:cs typeface="Calibri"/>
+              </a:rPr>
+              <a:t>Since Tensorflow.js still only runs on experimental Node.js. Currently only Google provides NLP APIs built on Tensorflow.js.</a:t>
+            </a:r>
           </a:p>
         </p:txBody>
       </p:sp>
     </p:spTree>
     <p:extLst>
       <p:ext uri="{BB962C8B-B14F-4D97-AF65-F5344CB8AC3E}">
-        <p14:creationId xmlns:p14="http://schemas.microsoft.com/office/powerpoint/2010/main" val="1111107165"/>
+        <p14:creationId xmlns:p14="http://schemas.microsoft.com/office/powerpoint/2010/main" val="4224461443"/>
       </p:ext>
     </p:extLst>
   </p:cSld>
@@ -4208,7 +5546,7 @@
           <p:cNvPr id="2" name="Title 1">
             <a:extLst>
               <a:ext uri="{FF2B5EF4-FFF2-40B4-BE49-F238E27FC236}">
-                <a16:creationId xmlns:a16="http://schemas.microsoft.com/office/drawing/2014/main" id="{C603E5F4-7E03-4E91-9A58-BA2D31F6C255}"/>
+                <a16:creationId xmlns:a16="http://schemas.microsoft.com/office/drawing/2014/main" id="{CAC2C6F0-F013-47F9-9A65-7E7EDACF829C}"/>
               </a:ext>
             </a:extLst>
           </p:cNvPr>
@@ -4226,7 +5564,7 @@
           <a:p>
             <a:pPr algn="ctr"/>
             <a:r>
-              <a:rPr lang="en-US">
+              <a:rPr lang="en-US" dirty="0">
                 <a:cs typeface="Calibri Light" panose="020F0302020204030204"/>
               </a:rPr>
               <a:t>Literature Survey</a:t>
@@ -4239,7 +5577,7 @@
           <p:cNvPr id="3" name="Content Placeholder 2">
             <a:extLst>
               <a:ext uri="{FF2B5EF4-FFF2-40B4-BE49-F238E27FC236}">
-                <a16:creationId xmlns:a16="http://schemas.microsoft.com/office/drawing/2014/main" id="{082142D9-7288-44D9-B983-9EC873349898}"/>
+                <a16:creationId xmlns:a16="http://schemas.microsoft.com/office/drawing/2014/main" id="{7015AAE9-DED0-4583-93D7-F25216D9058F}"/>
               </a:ext>
             </a:extLst>
           </p:cNvPr>
@@ -4253,52 +5591,170 @@
         <p:spPr/>
         <p:txBody>
           <a:bodyPr vert="horz" lIns="91440" tIns="45720" rIns="91440" bIns="45720" rtlCol="0" anchor="t">
-            <a:normAutofit/>
+            <a:normAutofit fontScale="92500" lnSpcReduction="10000"/>
           </a:bodyPr>
           <a:lstStyle/>
           <a:p>
             <a:pPr algn="just"/>
             <a:r>
-              <a:rPr lang="en-US" dirty="0">
-                <a:cs typeface="Calibri"/>
-              </a:rPr>
-              <a:t>A lot of research is being done every day in NLP. Providing NLP APIs is a complex task.</a:t>
+              <a:rPr lang="en-US" u="sng" dirty="0">
+                <a:cs typeface="Calibri"/>
+              </a:rPr>
+              <a:t>Existing Systems:</a:t>
             </a:r>
             <a:endParaRPr lang="en-US"/>
           </a:p>
           <a:p>
+            <a:pPr lvl="1" algn="just"/>
+            <a:r>
+              <a:rPr lang="en-US" b="1" dirty="0">
+                <a:ea typeface="+mn-lt"/>
+                <a:cs typeface="+mn-lt"/>
+              </a:rPr>
+              <a:t>Google Cloud Natural Language</a:t>
+            </a:r>
+            <a:r>
+              <a:rPr lang="en-US" dirty="0">
+                <a:ea typeface="+mn-lt"/>
+                <a:cs typeface="+mn-lt"/>
+              </a:rPr>
+              <a:t> API makes use of Tensorflow.js with Node.js to provide NLP services.</a:t>
+            </a:r>
+          </a:p>
+          <a:p>
+            <a:pPr lvl="1" algn="just"/>
+            <a:r>
+              <a:rPr lang="en-US" b="1" err="1">
+                <a:ea typeface="+mn-lt"/>
+                <a:cs typeface="+mn-lt"/>
+              </a:rPr>
+              <a:t>OpenNLP</a:t>
+            </a:r>
+            <a:r>
+              <a:rPr lang="en-US" dirty="0">
+                <a:ea typeface="+mn-lt"/>
+                <a:cs typeface="+mn-lt"/>
+              </a:rPr>
+              <a:t>, </a:t>
+            </a:r>
+            <a:r>
+              <a:rPr lang="en-US" b="1" dirty="0">
+                <a:cs typeface="Calibri"/>
+              </a:rPr>
+              <a:t>Stanford NLP</a:t>
+            </a:r>
+            <a:r>
+              <a:rPr lang="en-US" dirty="0">
+                <a:cs typeface="Calibri"/>
+              </a:rPr>
+              <a:t> provide NLP libraries that can be integrated with a given language.</a:t>
+            </a:r>
+            <a:endParaRPr lang="en-US" dirty="0">
+              <a:ea typeface="+mn-lt"/>
+              <a:cs typeface="+mn-lt"/>
+            </a:endParaRPr>
+          </a:p>
+          <a:p>
+            <a:pPr lvl="1" algn="just"/>
+            <a:r>
+              <a:rPr lang="en-US" b="1" dirty="0" err="1">
+                <a:cs typeface="Calibri"/>
+              </a:rPr>
+              <a:t>TextRazor</a:t>
+            </a:r>
+            <a:r>
+              <a:rPr lang="en-US" b="1" dirty="0">
+                <a:cs typeface="Calibri"/>
+              </a:rPr>
+              <a:t> </a:t>
+            </a:r>
+            <a:r>
+              <a:rPr lang="en-US" dirty="0">
+                <a:cs typeface="Calibri"/>
+              </a:rPr>
+              <a:t>provides NLP APIs but it is not built using Tensorflow.js.</a:t>
+            </a:r>
+          </a:p>
+          <a:p>
             <a:pPr algn="just"/>
             <a:r>
-              <a:rPr lang="en-US" dirty="0">
-                <a:cs typeface="Calibri"/>
-              </a:rPr>
-              <a:t>Tensorflow.js with Node.js can be used to build such APIs.</a:t>
-            </a:r>
-          </a:p>
-          <a:p>
-            <a:pPr algn="just"/>
-            <a:r>
-              <a:rPr lang="en-US" dirty="0">
-                <a:cs typeface="Calibri"/>
-              </a:rPr>
-              <a:t>Tensorflow.js allows us to interact with ML models directly from the browser. This is what makes it currently the best library for building NLP APIs.</a:t>
-            </a:r>
-          </a:p>
-          <a:p>
-            <a:pPr algn="just"/>
-            <a:r>
-              <a:rPr lang="en-US" dirty="0">
-                <a:cs typeface="Calibri"/>
-              </a:rPr>
-              <a:t>Since Tensorflow.js still only runs on experimental Node.js. Currently only Google provides NLP APIs built on Tensorflow.js.</a:t>
-            </a:r>
+              <a:rPr lang="en-US" u="sng" dirty="0">
+                <a:cs typeface="Calibri"/>
+              </a:rPr>
+              <a:t>Proposed System:</a:t>
+            </a:r>
+          </a:p>
+          <a:p>
+            <a:pPr lvl="1" algn="just"/>
+            <a:r>
+              <a:rPr lang="en-US" dirty="0">
+                <a:ea typeface="+mn-lt"/>
+                <a:cs typeface="+mn-lt"/>
+              </a:rPr>
+              <a:t>Context Analyzer makes use of </a:t>
+            </a:r>
+            <a:r>
+              <a:rPr lang="en-US" dirty="0" err="1">
+                <a:ea typeface="+mn-lt"/>
+                <a:cs typeface="+mn-lt"/>
+              </a:rPr>
+              <a:t>tfjs</a:t>
+            </a:r>
+            <a:r>
+              <a:rPr lang="en-US" dirty="0">
+                <a:ea typeface="+mn-lt"/>
+                <a:cs typeface="+mn-lt"/>
+              </a:rPr>
+              <a:t> with Node.js. Meaning, it does not depend on running python microservices for importing model and preprocessing.</a:t>
+            </a:r>
+          </a:p>
+          <a:p>
+            <a:pPr lvl="1" algn="just"/>
+            <a:r>
+              <a:rPr lang="en-US" dirty="0">
+                <a:ea typeface="+mn-lt"/>
+                <a:cs typeface="+mn-lt"/>
+              </a:rPr>
+              <a:t>All that is required is a cloud service to host the </a:t>
+            </a:r>
+            <a:r>
+              <a:rPr lang="en-US" dirty="0" err="1">
+                <a:ea typeface="+mn-lt"/>
+                <a:cs typeface="+mn-lt"/>
+              </a:rPr>
+              <a:t>model.json</a:t>
+            </a:r>
+            <a:r>
+              <a:rPr lang="en-US" dirty="0">
+                <a:ea typeface="+mn-lt"/>
+                <a:cs typeface="+mn-lt"/>
+              </a:rPr>
+              <a:t> file and the rest is taken care of by the APIs.</a:t>
+            </a:r>
+          </a:p>
+          <a:p>
+            <a:pPr lvl="1" algn="just"/>
+            <a:r>
+              <a:rPr lang="en-US" dirty="0">
+                <a:ea typeface="+mn-lt"/>
+                <a:cs typeface="+mn-lt"/>
+              </a:rPr>
+              <a:t>This is better than providing libraries as there is no need to import anything. The only requirement is to make API calls.</a:t>
+            </a:r>
+          </a:p>
+          <a:p>
+            <a:pPr lvl="1"/>
+            <a:endParaRPr lang="en-US" dirty="0">
+              <a:ea typeface="+mn-lt"/>
+              <a:cs typeface="+mn-lt"/>
+            </a:endParaRPr>
           </a:p>
         </p:txBody>
       </p:sp>
     </p:spTree>
     <p:extLst>
       <p:ext uri="{BB962C8B-B14F-4D97-AF65-F5344CB8AC3E}">
-        <p14:creationId xmlns:p14="http://schemas.microsoft.com/office/powerpoint/2010/main" val="4224461443"/>
+        <p14:creationId xmlns:p14="http://schemas.microsoft.com/office/powerpoint/2010/main" val="1853761156"/>
       </p:ext>
     </p:extLst>
   </p:cSld>
@@ -4330,7 +5786,7 @@
           <p:cNvPr id="2" name="Title 1">
             <a:extLst>
               <a:ext uri="{FF2B5EF4-FFF2-40B4-BE49-F238E27FC236}">
-                <a16:creationId xmlns:a16="http://schemas.microsoft.com/office/drawing/2014/main" id="{CAC2C6F0-F013-47F9-9A65-7E7EDACF829C}"/>
+                <a16:creationId xmlns:a16="http://schemas.microsoft.com/office/drawing/2014/main" id="{43A314C0-77B3-4A77-B8FE-74F30F1D1AC3}"/>
               </a:ext>
             </a:extLst>
           </p:cNvPr>
@@ -4351,7 +5807,7 @@
               <a:rPr lang="en-US" dirty="0">
                 <a:cs typeface="Calibri Light" panose="020F0302020204030204"/>
               </a:rPr>
-              <a:t>Literature Survey</a:t>
+              <a:t>Tools and Technologies</a:t>
             </a:r>
           </a:p>
         </p:txBody>
@@ -4361,7 +5817,7 @@
           <p:cNvPr id="3" name="Content Placeholder 2">
             <a:extLst>
               <a:ext uri="{FF2B5EF4-FFF2-40B4-BE49-F238E27FC236}">
-                <a16:creationId xmlns:a16="http://schemas.microsoft.com/office/drawing/2014/main" id="{7015AAE9-DED0-4583-93D7-F25216D9058F}"/>
+                <a16:creationId xmlns:a16="http://schemas.microsoft.com/office/drawing/2014/main" id="{F99C5E96-510A-4259-A1A2-129A3D5AA8B7}"/>
               </a:ext>
             </a:extLst>
           </p:cNvPr>
@@ -4375,151 +5831,89 @@
         <p:spPr/>
         <p:txBody>
           <a:bodyPr vert="horz" lIns="91440" tIns="45720" rIns="91440" bIns="45720" rtlCol="0" anchor="t">
-            <a:normAutofit fontScale="92500" lnSpcReduction="10000"/>
+            <a:normAutofit/>
           </a:bodyPr>
           <a:lstStyle/>
           <a:p>
-            <a:pPr algn="just"/>
-            <a:r>
-              <a:rPr lang="en-US" u="sng" dirty="0">
-                <a:cs typeface="Calibri"/>
-              </a:rPr>
-              <a:t>Existing Systems:</a:t>
+            <a:r>
+              <a:rPr lang="en-US" dirty="0">
+                <a:cs typeface="Calibri"/>
+              </a:rPr>
+              <a:t>Front-end</a:t>
             </a:r>
             <a:endParaRPr lang="en-US"/>
           </a:p>
           <a:p>
-            <a:pPr lvl="1" algn="just"/>
+            <a:pPr lvl="1"/>
             <a:r>
               <a:rPr lang="en-US" dirty="0">
                 <a:ea typeface="+mn-lt"/>
                 <a:cs typeface="+mn-lt"/>
               </a:rPr>
-              <a:t>Google Cloud Natural Language API makes use of Tensorflow.js with Node.js to provide NLP services.</a:t>
-            </a:r>
-          </a:p>
-          <a:p>
-            <a:pPr lvl="1" algn="just"/>
-            <a:r>
-              <a:rPr lang="en-US" dirty="0" err="1">
-                <a:ea typeface="+mn-lt"/>
-                <a:cs typeface="+mn-lt"/>
-              </a:rPr>
-              <a:t>OpenNLP</a:t>
-            </a:r>
-            <a:r>
-              <a:rPr lang="en-US" dirty="0">
-                <a:ea typeface="+mn-lt"/>
-                <a:cs typeface="+mn-lt"/>
-              </a:rPr>
-              <a:t>, </a:t>
-            </a:r>
-            <a:r>
-              <a:rPr lang="en-US" dirty="0">
-                <a:cs typeface="Calibri"/>
-              </a:rPr>
-              <a:t>Stanford NLP provide NLP libraries that can be integrated with a given language.</a:t>
-            </a:r>
-            <a:endParaRPr lang="en-US" dirty="0">
-              <a:ea typeface="+mn-lt"/>
-              <a:cs typeface="+mn-lt"/>
+              <a:t>HTML, CSS, Handlebars.js</a:t>
+            </a:r>
+            <a:endParaRPr lang="en-US">
+              <a:cs typeface="Calibri"/>
             </a:endParaRPr>
           </a:p>
           <a:p>
-            <a:pPr lvl="1" algn="just"/>
-            <a:r>
-              <a:rPr lang="en-US" dirty="0" err="1">
-                <a:cs typeface="Calibri"/>
-              </a:rPr>
-              <a:t>TextRazor</a:t>
-            </a:r>
-            <a:r>
-              <a:rPr lang="en-US" dirty="0">
-                <a:cs typeface="Calibri"/>
-              </a:rPr>
-              <a:t> provides NLP APIs but it is not built using Tensorflow.js.</a:t>
-            </a:r>
-          </a:p>
-          <a:p>
-            <a:pPr algn="just"/>
-            <a:r>
-              <a:rPr lang="en-US" u="sng" dirty="0">
-                <a:cs typeface="Calibri"/>
-              </a:rPr>
-              <a:t>Proposed System:</a:t>
-            </a:r>
-          </a:p>
-          <a:p>
-            <a:pPr lvl="1" algn="just"/>
-            <a:r>
-              <a:rPr lang="en-US" dirty="0">
-                <a:ea typeface="+mn-lt"/>
-                <a:cs typeface="+mn-lt"/>
-              </a:rPr>
-              <a:t>Context Analyzer makes use of </a:t>
-            </a:r>
-            <a:r>
-              <a:rPr lang="en-US" dirty="0" err="1">
-                <a:ea typeface="+mn-lt"/>
-                <a:cs typeface="+mn-lt"/>
-              </a:rPr>
-              <a:t>tfjs</a:t>
-            </a:r>
-            <a:r>
-              <a:rPr lang="en-US" dirty="0">
-                <a:ea typeface="+mn-lt"/>
-                <a:cs typeface="+mn-lt"/>
-              </a:rPr>
-              <a:t> with Node.js. Meaning, it does not depend on running python microservices for importing model and preprocessing.</a:t>
-            </a:r>
-          </a:p>
-          <a:p>
-            <a:pPr lvl="1" algn="just"/>
-            <a:r>
-              <a:rPr lang="en-US" dirty="0">
-                <a:ea typeface="+mn-lt"/>
-                <a:cs typeface="+mn-lt"/>
-              </a:rPr>
-              <a:t>All that is required is a cloud service to host the </a:t>
-            </a:r>
-            <a:r>
-              <a:rPr lang="en-US" dirty="0" err="1">
-                <a:ea typeface="+mn-lt"/>
-                <a:cs typeface="+mn-lt"/>
-              </a:rPr>
-              <a:t>model.json</a:t>
-            </a:r>
-            <a:r>
-              <a:rPr lang="en-US" dirty="0">
-                <a:ea typeface="+mn-lt"/>
-                <a:cs typeface="+mn-lt"/>
-              </a:rPr>
-              <a:t> file and the rest is taken care of by the APIs.</a:t>
-            </a:r>
-          </a:p>
-          <a:p>
-            <a:pPr lvl="1" algn="just"/>
-            <a:r>
-              <a:rPr lang="en-US" dirty="0">
-                <a:ea typeface="+mn-lt"/>
-                <a:cs typeface="+mn-lt"/>
-              </a:rPr>
-              <a:t>This is better than providing libraries as there is no need to import anything. The only requirement is to make API calls.</a:t>
+            <a:r>
+              <a:rPr lang="en-US" dirty="0">
+                <a:cs typeface="Calibri"/>
+              </a:rPr>
+              <a:t>Back-end</a:t>
             </a:r>
           </a:p>
           <a:p>
             <a:pPr lvl="1"/>
-            <a:endParaRPr lang="en-US" dirty="0">
-              <a:ea typeface="+mn-lt"/>
-              <a:cs typeface="+mn-lt"/>
-            </a:endParaRPr>
+            <a:r>
+              <a:rPr lang="en-US" dirty="0">
+                <a:cs typeface="Calibri"/>
+              </a:rPr>
+              <a:t>Node.js, Express.js</a:t>
+            </a:r>
+          </a:p>
+          <a:p>
+            <a:r>
+              <a:rPr lang="en-US" dirty="0">
+                <a:cs typeface="Calibri"/>
+              </a:rPr>
+              <a:t>Languages and Libraries</a:t>
+            </a:r>
+            <a:endParaRPr lang="en-US"/>
+          </a:p>
+          <a:p>
+            <a:pPr lvl="1"/>
+            <a:r>
+              <a:rPr lang="en-US" dirty="0">
+                <a:cs typeface="Calibri"/>
+              </a:rPr>
+              <a:t>Python 3, Tensorflow.js</a:t>
+            </a:r>
+          </a:p>
+          <a:p>
+            <a:r>
+              <a:rPr lang="en-US" dirty="0">
+                <a:cs typeface="Calibri"/>
+              </a:rPr>
+              <a:t>Code Editor</a:t>
+            </a:r>
+          </a:p>
+          <a:p>
+            <a:pPr lvl="1"/>
+            <a:r>
+              <a:rPr lang="en-US" dirty="0">
+                <a:cs typeface="Calibri"/>
+              </a:rPr>
+              <a:t>Visual Studio Code</a:t>
+            </a:r>
           </a:p>
         </p:txBody>
       </p:sp>
     </p:spTree>
     <p:extLst>
       <p:ext uri="{BB962C8B-B14F-4D97-AF65-F5344CB8AC3E}">
-        <p14:creationId xmlns:p14="http://schemas.microsoft.com/office/powerpoint/2010/main" val="1853761156"/>
+        <p14:creationId xmlns:p14="http://schemas.microsoft.com/office/powerpoint/2010/main" val="4183685459"/>
       </p:ext>
     </p:extLst>
   </p:cSld>
@@ -4551,7 +5945,7 @@
           <p:cNvPr id="2" name="Title 1">
             <a:extLst>
               <a:ext uri="{FF2B5EF4-FFF2-40B4-BE49-F238E27FC236}">
-                <a16:creationId xmlns:a16="http://schemas.microsoft.com/office/drawing/2014/main" id="{43A314C0-77B3-4A77-B8FE-74F30F1D1AC3}"/>
+                <a16:creationId xmlns:a16="http://schemas.microsoft.com/office/drawing/2014/main" id="{0A0A8516-F7DA-4EBC-AED9-C26542E6F857}"/>
               </a:ext>
             </a:extLst>
           </p:cNvPr>
@@ -4569,11 +5963,14 @@
           <a:p>
             <a:pPr algn="ctr"/>
             <a:r>
-              <a:rPr lang="en-US" dirty="0">
-                <a:cs typeface="Calibri Light" panose="020F0302020204030204"/>
-              </a:rPr>
-              <a:t>Tools and Technologies</a:t>
-            </a:r>
+              <a:rPr lang="en-US">
+                <a:cs typeface="Calibri Light"/>
+              </a:rPr>
+              <a:t>Functional Requirements</a:t>
+            </a:r>
+            <a:endParaRPr lang="en-US" dirty="0">
+              <a:cs typeface="Calibri Light"/>
+            </a:endParaRPr>
           </a:p>
         </p:txBody>
       </p:sp>
@@ -4582,7 +5979,7 @@
           <p:cNvPr id="3" name="Content Placeholder 2">
             <a:extLst>
               <a:ext uri="{FF2B5EF4-FFF2-40B4-BE49-F238E27FC236}">
-                <a16:creationId xmlns:a16="http://schemas.microsoft.com/office/drawing/2014/main" id="{F99C5E96-510A-4259-A1A2-129A3D5AA8B7}"/>
+                <a16:creationId xmlns:a16="http://schemas.microsoft.com/office/drawing/2014/main" id="{6992825B-62A6-4488-8566-CC0944726E6A}"/>
               </a:ext>
             </a:extLst>
           </p:cNvPr>
@@ -4596,81 +5993,111 @@
         <p:spPr/>
         <p:txBody>
           <a:bodyPr vert="horz" lIns="91440" tIns="45720" rIns="91440" bIns="45720" rtlCol="0" anchor="t">
-            <a:normAutofit/>
+            <a:normAutofit fontScale="92500" lnSpcReduction="20000"/>
           </a:bodyPr>
           <a:lstStyle/>
           <a:p>
-            <a:r>
-              <a:rPr lang="en-US" dirty="0">
-                <a:cs typeface="Calibri"/>
-              </a:rPr>
-              <a:t>Front-end</a:t>
-            </a:r>
-            <a:endParaRPr lang="en-US"/>
-          </a:p>
-          <a:p>
-            <a:pPr lvl="1"/>
+            <a:pPr algn="just"/>
+            <a:r>
+              <a:rPr lang="en-US" dirty="0">
+                <a:cs typeface="Calibri"/>
+              </a:rPr>
+              <a:t>Pre-Processing</a:t>
+            </a:r>
+            <a:endParaRPr lang="en-US" dirty="0"/>
+          </a:p>
+          <a:p>
+            <a:pPr lvl="1" algn="just"/>
             <a:r>
               <a:rPr lang="en-US" dirty="0">
                 <a:ea typeface="+mn-lt"/>
                 <a:cs typeface="+mn-lt"/>
               </a:rPr>
-              <a:t>HTML, CSS, Handlebars.js</a:t>
-            </a:r>
-            <a:endParaRPr lang="en-US">
-              <a:cs typeface="Calibri"/>
-            </a:endParaRPr>
-          </a:p>
-          <a:p>
-            <a:r>
-              <a:rPr lang="en-US" dirty="0">
-                <a:cs typeface="Calibri"/>
-              </a:rPr>
-              <a:t>Back-end</a:t>
-            </a:r>
-          </a:p>
-          <a:p>
-            <a:pPr lvl="1"/>
-            <a:r>
-              <a:rPr lang="en-US" dirty="0">
-                <a:cs typeface="Calibri"/>
-              </a:rPr>
-              <a:t>Node.js, Express.js</a:t>
-            </a:r>
-          </a:p>
-          <a:p>
-            <a:r>
-              <a:rPr lang="en-US" dirty="0">
-                <a:cs typeface="Calibri"/>
-              </a:rPr>
-              <a:t>Languages and Libraries</a:t>
-            </a:r>
-            <a:endParaRPr lang="en-US"/>
-          </a:p>
-          <a:p>
-            <a:pPr lvl="1"/>
-            <a:r>
-              <a:rPr lang="en-US" dirty="0">
-                <a:cs typeface="Calibri"/>
-              </a:rPr>
-              <a:t>Python 3, Tensorflow.js</a:t>
-            </a:r>
-          </a:p>
-          <a:p>
-            <a:r>
-              <a:rPr lang="en-US" dirty="0">
-                <a:cs typeface="Calibri"/>
-              </a:rPr>
-              <a:t>Code Editor</a:t>
-            </a:r>
-          </a:p>
-          <a:p>
-            <a:pPr lvl="1"/>
-            <a:r>
-              <a:rPr lang="en-US" dirty="0">
-                <a:cs typeface="Calibri"/>
-              </a:rPr>
-              <a:t>Visual Studio Code</a:t>
+              <a:t>Clean the input data. Tokenize the data to turn it into a single Tensor.</a:t>
+            </a:r>
+          </a:p>
+          <a:p>
+            <a:pPr algn="just"/>
+            <a:r>
+              <a:rPr lang="en-US" dirty="0">
+                <a:cs typeface="Calibri"/>
+              </a:rPr>
+              <a:t>Train the model using the pre-processed dataset</a:t>
+            </a:r>
+          </a:p>
+          <a:p>
+            <a:pPr lvl="1" algn="just"/>
+            <a:r>
+              <a:rPr lang="en-US" dirty="0">
+                <a:cs typeface="Calibri"/>
+              </a:rPr>
+              <a:t>Train </a:t>
+            </a:r>
+            <a:r>
+              <a:rPr lang="en-US" dirty="0" err="1">
+                <a:cs typeface="Calibri"/>
+              </a:rPr>
+              <a:t>Keras</a:t>
+            </a:r>
+            <a:r>
+              <a:rPr lang="en-US" dirty="0">
+                <a:cs typeface="Calibri"/>
+              </a:rPr>
+              <a:t> sequential model using appropriate parameters.</a:t>
+            </a:r>
+          </a:p>
+          <a:p>
+            <a:pPr algn="just"/>
+            <a:r>
+              <a:rPr lang="en-US" dirty="0">
+                <a:cs typeface="Calibri"/>
+              </a:rPr>
+              <a:t>Test the model for accuracy scores</a:t>
+            </a:r>
+          </a:p>
+          <a:p>
+            <a:pPr lvl="1" algn="just"/>
+            <a:r>
+              <a:rPr lang="en-US" dirty="0">
+                <a:cs typeface="Calibri"/>
+              </a:rPr>
+              <a:t>The trained model is used to make predictions. The predictions are used to calculate accuracy scores.</a:t>
+            </a:r>
+          </a:p>
+          <a:p>
+            <a:pPr algn="just"/>
+            <a:r>
+              <a:rPr lang="en-US" dirty="0">
+                <a:cs typeface="Calibri"/>
+              </a:rPr>
+              <a:t>Server side preprocessing</a:t>
+            </a:r>
+          </a:p>
+          <a:p>
+            <a:pPr lvl="1" algn="just"/>
+            <a:r>
+              <a:rPr lang="en-US" dirty="0">
+                <a:cs typeface="Calibri"/>
+              </a:rPr>
+              <a:t>The user inputs text data that has to be converted to a tensor. This needs the same pre-processing techniques.</a:t>
+            </a:r>
+          </a:p>
+          <a:p>
+            <a:pPr algn="just"/>
+            <a:r>
+              <a:rPr lang="en-US" dirty="0">
+                <a:cs typeface="Calibri"/>
+              </a:rPr>
+              <a:t>Probability score output to human readable class</a:t>
+            </a:r>
+          </a:p>
+          <a:p>
+            <a:pPr lvl="1" algn="just"/>
+            <a:r>
+              <a:rPr lang="en-US" dirty="0">
+                <a:cs typeface="Calibri"/>
+              </a:rPr>
+              <a:t>The model returns a probability score as output that has to be shown as human readable class.</a:t>
             </a:r>
           </a:p>
         </p:txBody>
@@ -4678,7 +6105,7 @@
     </p:spTree>
     <p:extLst>
       <p:ext uri="{BB962C8B-B14F-4D97-AF65-F5344CB8AC3E}">
-        <p14:creationId xmlns:p14="http://schemas.microsoft.com/office/powerpoint/2010/main" val="4183685459"/>
+        <p14:creationId xmlns:p14="http://schemas.microsoft.com/office/powerpoint/2010/main" val="2983497765"/>
       </p:ext>
     </p:extLst>
   </p:cSld>
@@ -4710,7 +6137,7 @@
           <p:cNvPr id="2" name="Title 1">
             <a:extLst>
               <a:ext uri="{FF2B5EF4-FFF2-40B4-BE49-F238E27FC236}">
-                <a16:creationId xmlns:a16="http://schemas.microsoft.com/office/drawing/2014/main" id="{0A0A8516-F7DA-4EBC-AED9-C26542E6F857}"/>
+                <a16:creationId xmlns:a16="http://schemas.microsoft.com/office/drawing/2014/main" id="{EF06EA2A-5335-41A7-B88A-5440702D3A5C}"/>
               </a:ext>
             </a:extLst>
           </p:cNvPr>
@@ -4729,13 +6156,10 @@
             <a:pPr algn="ctr"/>
             <a:r>
               <a:rPr lang="en-US">
-                <a:cs typeface="Calibri Light"/>
-              </a:rPr>
-              <a:t>Functional Requirements</a:t>
-            </a:r>
-            <a:endParaRPr lang="en-US" dirty="0">
-              <a:cs typeface="Calibri Light"/>
-            </a:endParaRPr>
+                <a:cs typeface="Calibri Light" panose="020F0302020204030204"/>
+              </a:rPr>
+              <a:t>Non-functional Requirements</a:t>
+            </a:r>
           </a:p>
         </p:txBody>
       </p:sp>
@@ -4744,7 +6168,7 @@
           <p:cNvPr id="3" name="Content Placeholder 2">
             <a:extLst>
               <a:ext uri="{FF2B5EF4-FFF2-40B4-BE49-F238E27FC236}">
-                <a16:creationId xmlns:a16="http://schemas.microsoft.com/office/drawing/2014/main" id="{6992825B-62A6-4488-8566-CC0944726E6A}"/>
+                <a16:creationId xmlns:a16="http://schemas.microsoft.com/office/drawing/2014/main" id="{829A0375-0F36-4FC5-94C5-2BD1EF3C4534}"/>
               </a:ext>
             </a:extLst>
           </p:cNvPr>
@@ -4758,111 +6182,63 @@
         <p:spPr/>
         <p:txBody>
           <a:bodyPr vert="horz" lIns="91440" tIns="45720" rIns="91440" bIns="45720" rtlCol="0" anchor="t">
-            <a:normAutofit fontScale="92500" lnSpcReduction="20000"/>
+            <a:normAutofit/>
           </a:bodyPr>
           <a:lstStyle/>
           <a:p>
-            <a:pPr algn="just"/>
-            <a:r>
-              <a:rPr lang="en-US" dirty="0">
-                <a:cs typeface="Calibri"/>
-              </a:rPr>
-              <a:t>Pre-Processing</a:t>
-            </a:r>
-            <a:endParaRPr lang="en-US" dirty="0"/>
-          </a:p>
-          <a:p>
-            <a:pPr lvl="1" algn="just"/>
-            <a:r>
-              <a:rPr lang="en-US" dirty="0">
-                <a:ea typeface="+mn-lt"/>
-                <a:cs typeface="+mn-lt"/>
-              </a:rPr>
-              <a:t>Clean the input data. Tokenize the data to turn it into a single Tensor.</a:t>
-            </a:r>
-          </a:p>
-          <a:p>
-            <a:pPr algn="just"/>
-            <a:r>
-              <a:rPr lang="en-US" dirty="0">
-                <a:cs typeface="Calibri"/>
-              </a:rPr>
-              <a:t>Train the model using the pre-processed dataset</a:t>
-            </a:r>
-          </a:p>
-          <a:p>
-            <a:pPr lvl="1" algn="just"/>
-            <a:r>
-              <a:rPr lang="en-US" dirty="0">
-                <a:cs typeface="Calibri"/>
-              </a:rPr>
-              <a:t>Train </a:t>
-            </a:r>
-            <a:r>
-              <a:rPr lang="en-US" dirty="0" err="1">
-                <a:cs typeface="Calibri"/>
-              </a:rPr>
-              <a:t>Keras</a:t>
-            </a:r>
-            <a:r>
-              <a:rPr lang="en-US" dirty="0">
-                <a:cs typeface="Calibri"/>
-              </a:rPr>
-              <a:t> sequential model using appropriate parameters.</a:t>
-            </a:r>
-          </a:p>
-          <a:p>
-            <a:pPr algn="just"/>
-            <a:r>
-              <a:rPr lang="en-US" dirty="0">
-                <a:cs typeface="Calibri"/>
-              </a:rPr>
-              <a:t>Test the model for accuracy scores</a:t>
-            </a:r>
-          </a:p>
-          <a:p>
-            <a:pPr lvl="1" algn="just"/>
-            <a:r>
-              <a:rPr lang="en-US" dirty="0">
-                <a:cs typeface="Calibri"/>
-              </a:rPr>
-              <a:t>The trained model is used to make predictions. The predictions are used to calculate accuracy scores.</a:t>
-            </a:r>
-          </a:p>
-          <a:p>
-            <a:pPr algn="just"/>
-            <a:r>
-              <a:rPr lang="en-US" dirty="0">
-                <a:cs typeface="Calibri"/>
-              </a:rPr>
-              <a:t>Server side preprocessing</a:t>
-            </a:r>
-          </a:p>
-          <a:p>
-            <a:pPr lvl="1" algn="just"/>
-            <a:r>
-              <a:rPr lang="en-US" dirty="0">
-                <a:cs typeface="Calibri"/>
-              </a:rPr>
-              <a:t>The user inputs text data that has to be converted to a tensor. This needs the same pre-processing techniques.</a:t>
-            </a:r>
-          </a:p>
-          <a:p>
-            <a:pPr algn="just"/>
-            <a:r>
-              <a:rPr lang="en-US" dirty="0">
-                <a:cs typeface="Calibri"/>
-              </a:rPr>
-              <a:t>Probability score output to human readable class</a:t>
-            </a:r>
-          </a:p>
-          <a:p>
-            <a:pPr lvl="1" algn="just"/>
-            <a:r>
-              <a:rPr lang="en-US" dirty="0">
-                <a:cs typeface="Calibri"/>
-              </a:rPr>
-              <a:t>The model returns a probability score as output that has to be shown as human readable class.</a:t>
+            <a:r>
+              <a:rPr lang="en-US" b="1" dirty="0">
+                <a:cs typeface="Calibri"/>
+              </a:rPr>
+              <a:t>Scaling</a:t>
+            </a:r>
+            <a:r>
+              <a:rPr lang="en-US" dirty="0">
+                <a:cs typeface="Calibri"/>
+              </a:rPr>
+              <a:t>: To be able to build more NLP APIs for different tasks.</a:t>
+            </a:r>
+          </a:p>
+          <a:p>
+            <a:r>
+              <a:rPr lang="en-US" b="1" dirty="0">
+                <a:cs typeface="Calibri"/>
+              </a:rPr>
+              <a:t>Performance</a:t>
+            </a:r>
+            <a:r>
+              <a:rPr lang="en-US" dirty="0">
+                <a:cs typeface="Calibri"/>
+              </a:rPr>
+              <a:t>: Increase accuracy of the predictions.</a:t>
+            </a:r>
+          </a:p>
+          <a:p>
+            <a:r>
+              <a:rPr lang="en-US" b="1" dirty="0">
+                <a:cs typeface="Calibri"/>
+              </a:rPr>
+              <a:t>Availability</a:t>
+            </a:r>
+            <a:r>
+              <a:rPr lang="en-US" dirty="0">
+                <a:cs typeface="Calibri"/>
+              </a:rPr>
+              <a:t>: To make sure that the web-app is always functioning properly and available to its users.</a:t>
+            </a:r>
+          </a:p>
+          <a:p>
+            <a:r>
+              <a:rPr lang="en-US" b="1" dirty="0">
+                <a:cs typeface="Calibri"/>
+              </a:rPr>
+              <a:t>Maintenance</a:t>
+            </a:r>
+            <a:r>
+              <a:rPr lang="en-US" dirty="0">
+                <a:cs typeface="Calibri"/>
+              </a:rPr>
+              <a:t>: Future updates must be smooth. Should work well with future versions of the technologies used.</a:t>
             </a:r>
           </a:p>
         </p:txBody>
@@ -4870,7 +6246,7 @@
     </p:spTree>
     <p:extLst>
       <p:ext uri="{BB962C8B-B14F-4D97-AF65-F5344CB8AC3E}">
-        <p14:creationId xmlns:p14="http://schemas.microsoft.com/office/powerpoint/2010/main" val="2983497765"/>
+        <p14:creationId xmlns:p14="http://schemas.microsoft.com/office/powerpoint/2010/main" val="4109507159"/>
       </p:ext>
     </p:extLst>
   </p:cSld>

</xml_diff>